<commit_message>
Update Server Presentation formatting
</commit_message>
<xml_diff>
--- a/doc/Starvation Evasion Server.pptx
+++ b/doc/Starvation Evasion Server.pptx
@@ -110,6 +110,11 @@
       </a:defRPr>
     </a:lvl9pPr>
   </p:defaultTextStyle>
+  <p:extLst>
+    <p:ext uri="{EFAFB233-063F-42B5-8137-9DF3F51BA10A}">
+      <p15:sldGuideLst xmlns:p15="http://schemas.microsoft.com/office/powerpoint/2012/main"/>
+    </p:ext>
+  </p:extLst>
 </p:presentation>
 </file>
 
@@ -3497,10 +3502,16 @@
             <a:t>Handled by a </a:t>
           </a:r>
           <a:r>
-            <a:rPr lang="en-US" dirty="0" err="1" smtClean="0"/>
+            <a:rPr lang="en-US" dirty="0" err="1" smtClean="0">
+              <a:latin typeface="Courier New" panose="02070309020205020404" pitchFamily="49" charset="0"/>
+              <a:cs typeface="Courier New" panose="02070309020205020404" pitchFamily="49" charset="0"/>
+            </a:rPr>
             <a:t>ScheduledExecutorService</a:t>
           </a:r>
-          <a:endParaRPr lang="en-US" dirty="0"/>
+          <a:endParaRPr lang="en-US" dirty="0">
+            <a:latin typeface="Courier New" panose="02070309020205020404" pitchFamily="49" charset="0"/>
+            <a:cs typeface="Courier New" panose="02070309020205020404" pitchFamily="49" charset="0"/>
+          </a:endParaRPr>
         </a:p>
       </dgm:t>
     </dgm:pt>
@@ -3535,6 +3546,13 @@
         </dgm:presLayoutVars>
       </dgm:prSet>
       <dgm:spPr/>
+      <dgm:t>
+        <a:bodyPr/>
+        <a:lstStyle/>
+        <a:p>
+          <a:endParaRPr lang="en-US"/>
+        </a:p>
+      </dgm:t>
     </dgm:pt>
     <dgm:pt modelId="{AB04FE16-1FB5-496A-A68E-1A0003219D39}" type="pres">
       <dgm:prSet presAssocID="{62B22E7C-3FCE-4957-87F2-ED9BE744D6E9}" presName="linNode" presStyleCnt="0"/>
@@ -3548,6 +3566,13 @@
         </dgm:presLayoutVars>
       </dgm:prSet>
       <dgm:spPr/>
+      <dgm:t>
+        <a:bodyPr/>
+        <a:lstStyle/>
+        <a:p>
+          <a:endParaRPr lang="en-US"/>
+        </a:p>
+      </dgm:t>
     </dgm:pt>
     <dgm:pt modelId="{87473130-C3D4-49DE-A7BC-3EAC449CA990}" type="pres">
       <dgm:prSet presAssocID="{62B22E7C-3FCE-4957-87F2-ED9BE744D6E9}" presName="bracket" presStyleLbl="parChTrans1D1" presStyleIdx="0" presStyleCnt="4"/>
@@ -3564,6 +3589,13 @@
         </dgm:presLayoutVars>
       </dgm:prSet>
       <dgm:spPr/>
+      <dgm:t>
+        <a:bodyPr/>
+        <a:lstStyle/>
+        <a:p>
+          <a:endParaRPr lang="en-US"/>
+        </a:p>
+      </dgm:t>
     </dgm:pt>
     <dgm:pt modelId="{95E3BEBB-4216-4AD9-A6E9-CC63079B536C}" type="pres">
       <dgm:prSet presAssocID="{2163E09A-4DE3-4192-B877-933A2581AF3E}" presName="spV" presStyleCnt="0"/>
@@ -3581,6 +3613,13 @@
         </dgm:presLayoutVars>
       </dgm:prSet>
       <dgm:spPr/>
+      <dgm:t>
+        <a:bodyPr/>
+        <a:lstStyle/>
+        <a:p>
+          <a:endParaRPr lang="en-US"/>
+        </a:p>
+      </dgm:t>
     </dgm:pt>
     <dgm:pt modelId="{E645AB5C-FEA3-4804-92D5-C7FE31DE78B3}" type="pres">
       <dgm:prSet presAssocID="{8DC27EA9-6CF2-48CB-BF25-4F2967FB6030}" presName="bracket" presStyleLbl="parChTrans1D1" presStyleIdx="1" presStyleCnt="4"/>
@@ -3597,6 +3636,13 @@
         </dgm:presLayoutVars>
       </dgm:prSet>
       <dgm:spPr/>
+      <dgm:t>
+        <a:bodyPr/>
+        <a:lstStyle/>
+        <a:p>
+          <a:endParaRPr lang="en-US"/>
+        </a:p>
+      </dgm:t>
     </dgm:pt>
     <dgm:pt modelId="{8CE97664-7B5C-4DEC-9C3B-E4D7ECC8A167}" type="pres">
       <dgm:prSet presAssocID="{8A81C8BF-A47D-4014-B077-D27CBC9C61BC}" presName="spV" presStyleCnt="0"/>
@@ -3614,6 +3660,13 @@
         </dgm:presLayoutVars>
       </dgm:prSet>
       <dgm:spPr/>
+      <dgm:t>
+        <a:bodyPr/>
+        <a:lstStyle/>
+        <a:p>
+          <a:endParaRPr lang="en-US"/>
+        </a:p>
+      </dgm:t>
     </dgm:pt>
     <dgm:pt modelId="{74C46C70-637E-4E9F-82BB-ACCB3E4634C7}" type="pres">
       <dgm:prSet presAssocID="{A27FA00B-4C3A-413E-9438-76E3E4F5A709}" presName="bracket" presStyleLbl="parChTrans1D1" presStyleIdx="2" presStyleCnt="4"/>
@@ -3630,6 +3683,13 @@
         </dgm:presLayoutVars>
       </dgm:prSet>
       <dgm:spPr/>
+      <dgm:t>
+        <a:bodyPr/>
+        <a:lstStyle/>
+        <a:p>
+          <a:endParaRPr lang="en-US"/>
+        </a:p>
+      </dgm:t>
     </dgm:pt>
     <dgm:pt modelId="{17CA7055-BF94-4AF6-BB56-A07C364E994E}" type="pres">
       <dgm:prSet presAssocID="{B6099AFD-0228-4B9C-84F2-82EC31368189}" presName="spV" presStyleCnt="0"/>
@@ -3647,6 +3707,13 @@
         </dgm:presLayoutVars>
       </dgm:prSet>
       <dgm:spPr/>
+      <dgm:t>
+        <a:bodyPr/>
+        <a:lstStyle/>
+        <a:p>
+          <a:endParaRPr lang="en-US"/>
+        </a:p>
+      </dgm:t>
     </dgm:pt>
     <dgm:pt modelId="{F3261F53-3DB1-4899-9813-092B95B7323D}" type="pres">
       <dgm:prSet presAssocID="{10C5F3D8-D623-4C06-BDF1-8D8D718AABED}" presName="bracket" presStyleLbl="parChTrans1D1" presStyleIdx="3" presStyleCnt="4"/>
@@ -3673,29 +3740,29 @@
     </dgm:pt>
   </dgm:ptLst>
   <dgm:cxnLst>
-    <dgm:cxn modelId="{44E416F0-CE20-427E-8C23-8B71A6BF0E0C}" srcId="{8DC27EA9-6CF2-48CB-BF25-4F2967FB6030}" destId="{935AF55F-D699-4702-A6FB-0ABD64D5C13E}" srcOrd="0" destOrd="0" parTransId="{0181E6FE-6954-4118-AF0A-53228835FB41}" sibTransId="{9B88AF23-20ED-48E7-B9EB-4DA0E91BDBC3}"/>
+    <dgm:cxn modelId="{BFF91916-3F1E-4745-BE73-99CD15F28BEA}" srcId="{FBA0F676-91FE-4379-8943-D1157C608758}" destId="{A27FA00B-4C3A-413E-9438-76E3E4F5A709}" srcOrd="2" destOrd="0" parTransId="{DF004D31-6D03-4FDC-B090-35A5678220F9}" sibTransId="{B6099AFD-0228-4B9C-84F2-82EC31368189}"/>
+    <dgm:cxn modelId="{9F43F2C3-074A-4200-8AB3-AD8280F99596}" type="presOf" srcId="{FBA0F676-91FE-4379-8943-D1157C608758}" destId="{73C09862-7233-467B-85F7-7E9571937E8C}" srcOrd="0" destOrd="0" presId="urn:diagrams.loki3.com/BracketList"/>
+    <dgm:cxn modelId="{6DAF8122-3019-4358-BF71-065935D3EA89}" type="presOf" srcId="{C441D749-CD17-4516-B9B5-68634AC0870C}" destId="{38D52FA8-5B36-4E64-8172-D3D3223F94B1}" srcOrd="0" destOrd="0" presId="urn:diagrams.loki3.com/BracketList"/>
+    <dgm:cxn modelId="{1813741F-3A98-4CC6-9246-82301E00E8CD}" type="presOf" srcId="{49F113F2-0E4F-44CA-9DE5-6F4B27892A68}" destId="{8FAF9188-1855-4F8D-AF0E-35EFC4389431}" srcOrd="0" destOrd="0" presId="urn:diagrams.loki3.com/BracketList"/>
+    <dgm:cxn modelId="{533E4A89-5CFB-4D5D-920F-47C272BD19DA}" srcId="{10C5F3D8-D623-4C06-BDF1-8D8D718AABED}" destId="{A4FDA689-CEF8-479D-A81F-B6894A6BF8FC}" srcOrd="1" destOrd="0" parTransId="{656F641F-E0B0-4731-B6DB-EE5AC18864DE}" sibTransId="{9EC02753-C39F-47A9-A173-EA8570113FCB}"/>
+    <dgm:cxn modelId="{384ED0E8-5DAA-45CC-B44A-86425EAE9BBE}" type="presOf" srcId="{A4FDA689-CEF8-479D-A81F-B6894A6BF8FC}" destId="{2EA0DA68-DF36-492B-A25E-4E698BD57336}" srcOrd="0" destOrd="1" presId="urn:diagrams.loki3.com/BracketList"/>
     <dgm:cxn modelId="{C534876A-677F-47CB-A8C2-7B200F7FC3EB}" srcId="{62B22E7C-3FCE-4957-87F2-ED9BE744D6E9}" destId="{49F113F2-0E4F-44CA-9DE5-6F4B27892A68}" srcOrd="0" destOrd="0" parTransId="{E50B6AE9-319C-4FC6-8E38-55E7AF6902FB}" sibTransId="{BAD85D06-A36A-41E8-8E10-AFF643C29784}"/>
     <dgm:cxn modelId="{B3307516-0041-471F-84BB-8F350C6F7AD9}" type="presOf" srcId="{95BE79A3-A4BA-4762-AD55-5596A7AE1B47}" destId="{38D52FA8-5B36-4E64-8172-D3D3223F94B1}" srcOrd="0" destOrd="1" presId="urn:diagrams.loki3.com/BracketList"/>
+    <dgm:cxn modelId="{2B3EACFB-02DA-45FC-8042-BABCDA4FEC86}" srcId="{A27FA00B-4C3A-413E-9438-76E3E4F5A709}" destId="{C441D749-CD17-4516-B9B5-68634AC0870C}" srcOrd="0" destOrd="0" parTransId="{65F03986-F37B-4E54-855A-2D49ECF19126}" sibTransId="{F96167B8-DC24-43FE-BA55-87641775D20B}"/>
+    <dgm:cxn modelId="{CDCB31C3-B3A9-41AF-86AF-DF1CEBFAF56E}" srcId="{FBA0F676-91FE-4379-8943-D1157C608758}" destId="{8DC27EA9-6CF2-48CB-BF25-4F2967FB6030}" srcOrd="1" destOrd="0" parTransId="{18CEA64F-686A-4F98-B2D2-94218F63B86D}" sibTransId="{8A81C8BF-A47D-4014-B077-D27CBC9C61BC}"/>
+    <dgm:cxn modelId="{E83F7A68-FB0A-4C4A-8304-3B55DD220F2C}" srcId="{FBA0F676-91FE-4379-8943-D1157C608758}" destId="{62B22E7C-3FCE-4957-87F2-ED9BE744D6E9}" srcOrd="0" destOrd="0" parTransId="{71510C83-6CB3-4568-BD7E-E01B50D3BBF1}" sibTransId="{2163E09A-4DE3-4192-B877-933A2581AF3E}"/>
     <dgm:cxn modelId="{CFF14E4C-71CA-4860-8839-57D2EE7DB6F1}" type="presOf" srcId="{8DC27EA9-6CF2-48CB-BF25-4F2967FB6030}" destId="{5E4A9645-7F28-402D-933E-B300E896188C}" srcOrd="0" destOrd="0" presId="urn:diagrams.loki3.com/BracketList"/>
-    <dgm:cxn modelId="{E83F7A68-FB0A-4C4A-8304-3B55DD220F2C}" srcId="{FBA0F676-91FE-4379-8943-D1157C608758}" destId="{62B22E7C-3FCE-4957-87F2-ED9BE744D6E9}" srcOrd="0" destOrd="0" parTransId="{71510C83-6CB3-4568-BD7E-E01B50D3BBF1}" sibTransId="{2163E09A-4DE3-4192-B877-933A2581AF3E}"/>
+    <dgm:cxn modelId="{2847BE3C-4FB9-4463-8EBF-7B1F76A278BB}" type="presOf" srcId="{A96CC35F-5C33-4550-9A6F-DFE8BF05F7D4}" destId="{8FAF9188-1855-4F8D-AF0E-35EFC4389431}" srcOrd="0" destOrd="1" presId="urn:diagrams.loki3.com/BracketList"/>
+    <dgm:cxn modelId="{E2E372EE-23EA-4210-8EE1-A67BDC18CA92}" type="presOf" srcId="{A27FA00B-4C3A-413E-9438-76E3E4F5A709}" destId="{B01FF3D1-5BEF-4A0E-B64C-DC84FA1CD16B}" srcOrd="0" destOrd="0" presId="urn:diagrams.loki3.com/BracketList"/>
+    <dgm:cxn modelId="{C2552437-0808-4FD0-80A1-DAE0E3DB4D82}" type="presOf" srcId="{DD509D11-3B97-417C-9B4A-B8E9EE56EF98}" destId="{2EA0DA68-DF36-492B-A25E-4E698BD57336}" srcOrd="0" destOrd="0" presId="urn:diagrams.loki3.com/BracketList"/>
+    <dgm:cxn modelId="{5B24777C-FBFA-48DE-94B7-802A341F1BF5}" srcId="{62B22E7C-3FCE-4957-87F2-ED9BE744D6E9}" destId="{A96CC35F-5C33-4550-9A6F-DFE8BF05F7D4}" srcOrd="1" destOrd="0" parTransId="{D4F701AC-EFD1-4E76-9D7E-2DDEBF51C05C}" sibTransId="{DC14C468-CC8D-417B-987F-30C828FEB91A}"/>
+    <dgm:cxn modelId="{4FF09728-EA6B-43CA-B0F9-2BCDADEE3C9B}" type="presOf" srcId="{62B22E7C-3FCE-4957-87F2-ED9BE744D6E9}" destId="{FFE92195-A746-447C-8E4A-97098DDE5C9C}" srcOrd="0" destOrd="0" presId="urn:diagrams.loki3.com/BracketList"/>
+    <dgm:cxn modelId="{74871A6B-F2D2-4EBD-9658-F78F0BF5D454}" srcId="{FBA0F676-91FE-4379-8943-D1157C608758}" destId="{10C5F3D8-D623-4C06-BDF1-8D8D718AABED}" srcOrd="3" destOrd="0" parTransId="{5655800A-1EC4-4750-A654-AD6E7685C6B3}" sibTransId="{2FA1B363-851F-43BD-9166-5E3164E3367F}"/>
+    <dgm:cxn modelId="{0FE1CC68-F808-4507-8406-9AABF39F475F}" type="presOf" srcId="{935AF55F-D699-4702-A6FB-0ABD64D5C13E}" destId="{36CF7532-091E-47DB-B3DF-C7BFD227472A}" srcOrd="0" destOrd="0" presId="urn:diagrams.loki3.com/BracketList"/>
     <dgm:cxn modelId="{F874BA79-B696-4338-B6E4-F6100FC3E746}" srcId="{A27FA00B-4C3A-413E-9438-76E3E4F5A709}" destId="{95BE79A3-A4BA-4762-AD55-5596A7AE1B47}" srcOrd="1" destOrd="0" parTransId="{25921E99-D863-4571-9878-91A3360F03B6}" sibTransId="{8FCD26E9-0A0F-42F0-80E3-1FB2C32D01CD}"/>
-    <dgm:cxn modelId="{6DAF8122-3019-4358-BF71-065935D3EA89}" type="presOf" srcId="{C441D749-CD17-4516-B9B5-68634AC0870C}" destId="{38D52FA8-5B36-4E64-8172-D3D3223F94B1}" srcOrd="0" destOrd="0" presId="urn:diagrams.loki3.com/BracketList"/>
-    <dgm:cxn modelId="{BFF91916-3F1E-4745-BE73-99CD15F28BEA}" srcId="{FBA0F676-91FE-4379-8943-D1157C608758}" destId="{A27FA00B-4C3A-413E-9438-76E3E4F5A709}" srcOrd="2" destOrd="0" parTransId="{DF004D31-6D03-4FDC-B090-35A5678220F9}" sibTransId="{B6099AFD-0228-4B9C-84F2-82EC31368189}"/>
-    <dgm:cxn modelId="{CDCB31C3-B3A9-41AF-86AF-DF1CEBFAF56E}" srcId="{FBA0F676-91FE-4379-8943-D1157C608758}" destId="{8DC27EA9-6CF2-48CB-BF25-4F2967FB6030}" srcOrd="1" destOrd="0" parTransId="{18CEA64F-686A-4F98-B2D2-94218F63B86D}" sibTransId="{8A81C8BF-A47D-4014-B077-D27CBC9C61BC}"/>
+    <dgm:cxn modelId="{44E416F0-CE20-427E-8C23-8B71A6BF0E0C}" srcId="{8DC27EA9-6CF2-48CB-BF25-4F2967FB6030}" destId="{935AF55F-D699-4702-A6FB-0ABD64D5C13E}" srcOrd="0" destOrd="0" parTransId="{0181E6FE-6954-4118-AF0A-53228835FB41}" sibTransId="{9B88AF23-20ED-48E7-B9EB-4DA0E91BDBC3}"/>
+    <dgm:cxn modelId="{B2278295-ED26-4EF0-825E-05C1E0F061B5}" type="presOf" srcId="{10C5F3D8-D623-4C06-BDF1-8D8D718AABED}" destId="{A2F7EC1C-7CFE-4D1C-B0E5-2BFF6C7A23F6}" srcOrd="0" destOrd="0" presId="urn:diagrams.loki3.com/BracketList"/>
     <dgm:cxn modelId="{060499E4-25E2-43BE-8427-785877297DED}" srcId="{10C5F3D8-D623-4C06-BDF1-8D8D718AABED}" destId="{DD509D11-3B97-417C-9B4A-B8E9EE56EF98}" srcOrd="0" destOrd="0" parTransId="{4C83A6E0-FD73-4FFB-8E86-B68B79FFE1FD}" sibTransId="{5C360159-B1FB-4325-BF65-3E5EF9D3AD88}"/>
-    <dgm:cxn modelId="{E2E372EE-23EA-4210-8EE1-A67BDC18CA92}" type="presOf" srcId="{A27FA00B-4C3A-413E-9438-76E3E4F5A709}" destId="{B01FF3D1-5BEF-4A0E-B64C-DC84FA1CD16B}" srcOrd="0" destOrd="0" presId="urn:diagrams.loki3.com/BracketList"/>
-    <dgm:cxn modelId="{533E4A89-5CFB-4D5D-920F-47C272BD19DA}" srcId="{10C5F3D8-D623-4C06-BDF1-8D8D718AABED}" destId="{A4FDA689-CEF8-479D-A81F-B6894A6BF8FC}" srcOrd="1" destOrd="0" parTransId="{656F641F-E0B0-4731-B6DB-EE5AC18864DE}" sibTransId="{9EC02753-C39F-47A9-A173-EA8570113FCB}"/>
-    <dgm:cxn modelId="{C2552437-0808-4FD0-80A1-DAE0E3DB4D82}" type="presOf" srcId="{DD509D11-3B97-417C-9B4A-B8E9EE56EF98}" destId="{2EA0DA68-DF36-492B-A25E-4E698BD57336}" srcOrd="0" destOrd="0" presId="urn:diagrams.loki3.com/BracketList"/>
-    <dgm:cxn modelId="{384ED0E8-5DAA-45CC-B44A-86425EAE9BBE}" type="presOf" srcId="{A4FDA689-CEF8-479D-A81F-B6894A6BF8FC}" destId="{2EA0DA68-DF36-492B-A25E-4E698BD57336}" srcOrd="0" destOrd="1" presId="urn:diagrams.loki3.com/BracketList"/>
-    <dgm:cxn modelId="{9F43F2C3-074A-4200-8AB3-AD8280F99596}" type="presOf" srcId="{FBA0F676-91FE-4379-8943-D1157C608758}" destId="{73C09862-7233-467B-85F7-7E9571937E8C}" srcOrd="0" destOrd="0" presId="urn:diagrams.loki3.com/BracketList"/>
-    <dgm:cxn modelId="{2847BE3C-4FB9-4463-8EBF-7B1F76A278BB}" type="presOf" srcId="{A96CC35F-5C33-4550-9A6F-DFE8BF05F7D4}" destId="{8FAF9188-1855-4F8D-AF0E-35EFC4389431}" srcOrd="0" destOrd="1" presId="urn:diagrams.loki3.com/BracketList"/>
-    <dgm:cxn modelId="{0FE1CC68-F808-4507-8406-9AABF39F475F}" type="presOf" srcId="{935AF55F-D699-4702-A6FB-0ABD64D5C13E}" destId="{36CF7532-091E-47DB-B3DF-C7BFD227472A}" srcOrd="0" destOrd="0" presId="urn:diagrams.loki3.com/BracketList"/>
-    <dgm:cxn modelId="{B2278295-ED26-4EF0-825E-05C1E0F061B5}" type="presOf" srcId="{10C5F3D8-D623-4C06-BDF1-8D8D718AABED}" destId="{A2F7EC1C-7CFE-4D1C-B0E5-2BFF6C7A23F6}" srcOrd="0" destOrd="0" presId="urn:diagrams.loki3.com/BracketList"/>
-    <dgm:cxn modelId="{4FF09728-EA6B-43CA-B0F9-2BCDADEE3C9B}" type="presOf" srcId="{62B22E7C-3FCE-4957-87F2-ED9BE744D6E9}" destId="{FFE92195-A746-447C-8E4A-97098DDE5C9C}" srcOrd="0" destOrd="0" presId="urn:diagrams.loki3.com/BracketList"/>
-    <dgm:cxn modelId="{5B24777C-FBFA-48DE-94B7-802A341F1BF5}" srcId="{62B22E7C-3FCE-4957-87F2-ED9BE744D6E9}" destId="{A96CC35F-5C33-4550-9A6F-DFE8BF05F7D4}" srcOrd="1" destOrd="0" parTransId="{D4F701AC-EFD1-4E76-9D7E-2DDEBF51C05C}" sibTransId="{DC14C468-CC8D-417B-987F-30C828FEB91A}"/>
-    <dgm:cxn modelId="{74871A6B-F2D2-4EBD-9658-F78F0BF5D454}" srcId="{FBA0F676-91FE-4379-8943-D1157C608758}" destId="{10C5F3D8-D623-4C06-BDF1-8D8D718AABED}" srcOrd="3" destOrd="0" parTransId="{5655800A-1EC4-4750-A654-AD6E7685C6B3}" sibTransId="{2FA1B363-851F-43BD-9166-5E3164E3367F}"/>
-    <dgm:cxn modelId="{2B3EACFB-02DA-45FC-8042-BABCDA4FEC86}" srcId="{A27FA00B-4C3A-413E-9438-76E3E4F5A709}" destId="{C441D749-CD17-4516-B9B5-68634AC0870C}" srcOrd="0" destOrd="0" parTransId="{65F03986-F37B-4E54-855A-2D49ECF19126}" sibTransId="{F96167B8-DC24-43FE-BA55-87641775D20B}"/>
-    <dgm:cxn modelId="{1813741F-3A98-4CC6-9246-82301E00E8CD}" type="presOf" srcId="{49F113F2-0E4F-44CA-9DE5-6F4B27892A68}" destId="{8FAF9188-1855-4F8D-AF0E-35EFC4389431}" srcOrd="0" destOrd="0" presId="urn:diagrams.loki3.com/BracketList"/>
     <dgm:cxn modelId="{37DA5BA7-7A10-44F3-9E20-6FA090B8B681}" type="presParOf" srcId="{73C09862-7233-467B-85F7-7E9571937E8C}" destId="{AB04FE16-1FB5-496A-A68E-1A0003219D39}" srcOrd="0" destOrd="0" presId="urn:diagrams.loki3.com/BracketList"/>
     <dgm:cxn modelId="{9B82F234-E18D-4019-8C88-5236C49B534D}" type="presParOf" srcId="{AB04FE16-1FB5-496A-A68E-1A0003219D39}" destId="{FFE92195-A746-447C-8E4A-97098DDE5C9C}" srcOrd="0" destOrd="0" presId="urn:diagrams.loki3.com/BracketList"/>
     <dgm:cxn modelId="{A2321EFC-F3E6-4D91-9D21-7EB201C6D943}" type="presParOf" srcId="{AB04FE16-1FB5-496A-A68E-1A0003219D39}" destId="{87473130-C3D4-49DE-A7BC-3EAC449CA990}" srcOrd="1" destOrd="0" presId="urn:diagrams.loki3.com/BracketList"/>
@@ -3758,10 +3825,6 @@
             </a:rPr>
             <a:t>$SEUSERNAME</a:t>
           </a:r>
-          <a:endParaRPr lang="en-US" dirty="0" smtClean="0">
-            <a:latin typeface="Courier New" panose="02070309020205020404" pitchFamily="49" charset="0"/>
-            <a:cs typeface="Courier New" panose="02070309020205020404" pitchFamily="49" charset="0"/>
-          </a:endParaRPr>
         </a:p>
       </dgm:t>
     </dgm:pt>
@@ -3801,10 +3864,6 @@
             </a:rPr>
             <a:t>$SEHOSTNAME:</a:t>
           </a:r>
-          <a:endParaRPr lang="en-US" dirty="0" smtClean="0">
-            <a:latin typeface="Courier New" panose="02070309020205020404" pitchFamily="49" charset="0"/>
-            <a:cs typeface="Courier New" panose="02070309020205020404" pitchFamily="49" charset="0"/>
-          </a:endParaRPr>
         </a:p>
       </dgm:t>
     </dgm:pt>
@@ -3887,10 +3946,6 @@
             </a:rPr>
             <a:t>$SEPASSWORD:</a:t>
           </a:r>
-          <a:endParaRPr lang="en-US" dirty="0" smtClean="0">
-            <a:latin typeface="Courier New" panose="02070309020205020404" pitchFamily="49" charset="0"/>
-            <a:cs typeface="Courier New" panose="02070309020205020404" pitchFamily="49" charset="0"/>
-          </a:endParaRPr>
         </a:p>
       </dgm:t>
     </dgm:pt>
@@ -3927,7 +3982,6 @@
             <a:rPr lang="en-US" dirty="0" smtClean="0"/>
             <a:t>Username to connect with</a:t>
           </a:r>
-          <a:endParaRPr lang="en-US" dirty="0" smtClean="0"/>
         </a:p>
       </dgm:t>
     </dgm:pt>
@@ -3964,7 +4018,6 @@
             <a:rPr lang="en-US" dirty="0" smtClean="0"/>
             <a:t>Password to connect with</a:t>
           </a:r>
-          <a:endParaRPr lang="en-US" dirty="0" smtClean="0"/>
         </a:p>
       </dgm:t>
     </dgm:pt>
@@ -4001,7 +4054,6 @@
             <a:rPr lang="en-US" dirty="0" smtClean="0"/>
             <a:t>Hostname of the server</a:t>
           </a:r>
-          <a:endParaRPr lang="en-US" dirty="0" smtClean="0"/>
         </a:p>
       </dgm:t>
     </dgm:pt>
@@ -4072,6 +4124,13 @@
         </dgm:presLayoutVars>
       </dgm:prSet>
       <dgm:spPr/>
+      <dgm:t>
+        <a:bodyPr/>
+        <a:lstStyle/>
+        <a:p>
+          <a:endParaRPr lang="en-US"/>
+        </a:p>
+      </dgm:t>
     </dgm:pt>
     <dgm:pt modelId="{A2F9A2B0-39F2-4BD8-B63C-367639B1161D}" type="pres">
       <dgm:prSet presAssocID="{0A0BE87A-6222-400B-A688-3EF4C22E4848}" presName="node" presStyleLbl="node1" presStyleIdx="0" presStyleCnt="4">
@@ -4080,6 +4139,13 @@
         </dgm:presLayoutVars>
       </dgm:prSet>
       <dgm:spPr/>
+      <dgm:t>
+        <a:bodyPr/>
+        <a:lstStyle/>
+        <a:p>
+          <a:endParaRPr lang="en-US"/>
+        </a:p>
+      </dgm:t>
     </dgm:pt>
     <dgm:pt modelId="{C34B28FE-965A-4346-A167-1A9B89F3818F}" type="pres">
       <dgm:prSet presAssocID="{89AFA317-265C-4778-8748-BE9E1497F99F}" presName="sibTrans" presStyleCnt="0"/>
@@ -4092,6 +4158,13 @@
         </dgm:presLayoutVars>
       </dgm:prSet>
       <dgm:spPr/>
+      <dgm:t>
+        <a:bodyPr/>
+        <a:lstStyle/>
+        <a:p>
+          <a:endParaRPr lang="en-US"/>
+        </a:p>
+      </dgm:t>
     </dgm:pt>
     <dgm:pt modelId="{5F25AAF5-6489-49EF-8A0C-10ABA1BF1AAF}" type="pres">
       <dgm:prSet presAssocID="{C72104E2-CA06-43DA-9E96-4F7FC1F3D513}" presName="sibTrans" presStyleCnt="0"/>
@@ -4104,6 +4177,13 @@
         </dgm:presLayoutVars>
       </dgm:prSet>
       <dgm:spPr/>
+      <dgm:t>
+        <a:bodyPr/>
+        <a:lstStyle/>
+        <a:p>
+          <a:endParaRPr lang="en-US"/>
+        </a:p>
+      </dgm:t>
     </dgm:pt>
     <dgm:pt modelId="{9AF3D9F4-4649-4D98-891A-165B8643E69B}" type="pres">
       <dgm:prSet presAssocID="{6349018F-19BB-45EB-A1F8-8D504916BB15}" presName="sibTrans" presStyleCnt="0"/>
@@ -4116,26 +4196,33 @@
         </dgm:presLayoutVars>
       </dgm:prSet>
       <dgm:spPr/>
+      <dgm:t>
+        <a:bodyPr/>
+        <a:lstStyle/>
+        <a:p>
+          <a:endParaRPr lang="en-US"/>
+        </a:p>
+      </dgm:t>
     </dgm:pt>
   </dgm:ptLst>
   <dgm:cxnLst>
-    <dgm:cxn modelId="{CBE941A8-E076-487B-B6BF-8151A8B69D2A}" srcId="{86C549A0-F570-4109-BFD2-0C92488BEF98}" destId="{F527DBF7-6F16-4711-B422-9646B4CB2F8A}" srcOrd="3" destOrd="0" parTransId="{DECD9EEB-77F5-42FD-87A7-8655FED130A5}" sibTransId="{E630CAC3-B01D-4126-A175-072ED449D2CF}"/>
+    <dgm:cxn modelId="{819B6C46-A070-49ED-BF5E-B11233E21D56}" type="presOf" srcId="{9F4234E8-7EBD-4A9D-958F-275F8D76BF30}" destId="{8EA95343-D1E9-4DEE-AE47-AA63EF966FAF}" srcOrd="0" destOrd="0" presId="urn:microsoft.com/office/officeart/2005/8/layout/default"/>
+    <dgm:cxn modelId="{D587B8F8-697A-49C5-AF96-E7A7606DEDE2}" type="presOf" srcId="{70C13FE4-A81E-4084-BA9E-ACE1128921AC}" destId="{9A9DDF8B-2E83-4361-B594-08AF6280F78B}" srcOrd="0" destOrd="1" presId="urn:microsoft.com/office/officeart/2005/8/layout/default"/>
     <dgm:cxn modelId="{B95A818A-C6C0-4AB2-9B87-356D9643B5DE}" type="presOf" srcId="{F2D854CE-C0F2-4962-B310-712909B87FF2}" destId="{8EA95343-D1E9-4DEE-AE47-AA63EF966FAF}" srcOrd="0" destOrd="1" presId="urn:microsoft.com/office/officeart/2005/8/layout/default"/>
-    <dgm:cxn modelId="{D587B8F8-697A-49C5-AF96-E7A7606DEDE2}" type="presOf" srcId="{70C13FE4-A81E-4084-BA9E-ACE1128921AC}" destId="{9A9DDF8B-2E83-4361-B594-08AF6280F78B}" srcOrd="0" destOrd="1" presId="urn:microsoft.com/office/officeart/2005/8/layout/default"/>
-    <dgm:cxn modelId="{5B358D0D-AA0E-4876-A22D-6E607EC30D89}" srcId="{DD1D4123-2CCC-4FF6-A5A7-7D4D15F747AF}" destId="{05D03E3C-E725-426F-A91C-AECE9FA8AD74}" srcOrd="0" destOrd="0" parTransId="{4CA9D212-1E83-4A16-A463-2FD30C2F8A74}" sibTransId="{DEA0D0C2-A383-48F5-B930-99E0C41DFBAC}"/>
+    <dgm:cxn modelId="{8A55B4E8-3E7F-4467-896C-DEE7AB8DEB99}" srcId="{0A0BE87A-6222-400B-A688-3EF4C22E4848}" destId="{06DDB75B-D4E4-4197-A140-1E63F54A39CB}" srcOrd="0" destOrd="0" parTransId="{BE621C5F-488A-4EA9-A53D-F77179400547}" sibTransId="{19F191F9-A400-415F-8D79-41FE53170B73}"/>
+    <dgm:cxn modelId="{DF730FF9-C41D-4987-A541-60936BB50EDC}" type="presOf" srcId="{06DDB75B-D4E4-4197-A140-1E63F54A39CB}" destId="{A2F9A2B0-39F2-4BD8-B63C-367639B1161D}" srcOrd="0" destOrd="1" presId="urn:microsoft.com/office/officeart/2005/8/layout/default"/>
+    <dgm:cxn modelId="{33E71E4C-9127-4746-BD3F-CD3C1D122488}" type="presOf" srcId="{05D03E3C-E725-426F-A91C-AECE9FA8AD74}" destId="{30333E51-4182-4E1D-A173-11357FBD5130}" srcOrd="0" destOrd="1" presId="urn:microsoft.com/office/officeart/2005/8/layout/default"/>
+    <dgm:cxn modelId="{8E0C90C0-48D7-4BDC-9052-567577825AB8}" srcId="{86C549A0-F570-4109-BFD2-0C92488BEF98}" destId="{DD1D4123-2CCC-4FF6-A5A7-7D4D15F747AF}" srcOrd="1" destOrd="0" parTransId="{400C04E9-2A72-4B4C-AE75-7D3886C4B8A3}" sibTransId="{C72104E2-CA06-43DA-9E96-4F7FC1F3D513}"/>
     <dgm:cxn modelId="{88BA7B0A-7595-4749-BC51-7FFFACBB1203}" srcId="{86C549A0-F570-4109-BFD2-0C92488BEF98}" destId="{9F4234E8-7EBD-4A9D-958F-275F8D76BF30}" srcOrd="2" destOrd="0" parTransId="{83B3C81F-B83A-4C07-8D92-A78F520299B8}" sibTransId="{6349018F-19BB-45EB-A1F8-8D504916BB15}"/>
-    <dgm:cxn modelId="{E08B3B8A-1BA8-4C35-837E-E6ABAF9E6085}" type="presOf" srcId="{86C549A0-F570-4109-BFD2-0C92488BEF98}" destId="{3574C539-1F79-4EA4-AD8F-08ACB4CAC45B}" srcOrd="0" destOrd="0" presId="urn:microsoft.com/office/officeart/2005/8/layout/default"/>
-    <dgm:cxn modelId="{8E0C90C0-48D7-4BDC-9052-567577825AB8}" srcId="{86C549A0-F570-4109-BFD2-0C92488BEF98}" destId="{DD1D4123-2CCC-4FF6-A5A7-7D4D15F747AF}" srcOrd="1" destOrd="0" parTransId="{400C04E9-2A72-4B4C-AE75-7D3886C4B8A3}" sibTransId="{C72104E2-CA06-43DA-9E96-4F7FC1F3D513}"/>
-    <dgm:cxn modelId="{33E71E4C-9127-4746-BD3F-CD3C1D122488}" type="presOf" srcId="{05D03E3C-E725-426F-A91C-AECE9FA8AD74}" destId="{30333E51-4182-4E1D-A173-11357FBD5130}" srcOrd="0" destOrd="1" presId="urn:microsoft.com/office/officeart/2005/8/layout/default"/>
-    <dgm:cxn modelId="{DF730FF9-C41D-4987-A541-60936BB50EDC}" type="presOf" srcId="{06DDB75B-D4E4-4197-A140-1E63F54A39CB}" destId="{A2F9A2B0-39F2-4BD8-B63C-367639B1161D}" srcOrd="0" destOrd="1" presId="urn:microsoft.com/office/officeart/2005/8/layout/default"/>
+    <dgm:cxn modelId="{79768B16-0E61-42FD-A9D7-2FF94EAC7076}" type="presOf" srcId="{0A0BE87A-6222-400B-A688-3EF4C22E4848}" destId="{A2F9A2B0-39F2-4BD8-B63C-367639B1161D}" srcOrd="0" destOrd="0" presId="urn:microsoft.com/office/officeart/2005/8/layout/default"/>
+    <dgm:cxn modelId="{994F80C6-F143-4C62-913E-3B3E4D90E298}" srcId="{86C549A0-F570-4109-BFD2-0C92488BEF98}" destId="{0A0BE87A-6222-400B-A688-3EF4C22E4848}" srcOrd="0" destOrd="0" parTransId="{B0A2FFD6-821A-44AB-96D5-8641E415B7A7}" sibTransId="{89AFA317-265C-4778-8748-BE9E1497F99F}"/>
     <dgm:cxn modelId="{475BD32F-B2C3-472D-B5F4-B5D86F45F7FD}" srcId="{9F4234E8-7EBD-4A9D-958F-275F8D76BF30}" destId="{F2D854CE-C0F2-4962-B310-712909B87FF2}" srcOrd="0" destOrd="0" parTransId="{67906BC9-3436-4B88-9409-99798AB9858F}" sibTransId="{516DC6B3-E041-4306-A40D-DA992ED988EB}"/>
     <dgm:cxn modelId="{F8BB8A76-25C1-4720-8716-47CA153276A7}" type="presOf" srcId="{DD1D4123-2CCC-4FF6-A5A7-7D4D15F747AF}" destId="{30333E51-4182-4E1D-A173-11357FBD5130}" srcOrd="0" destOrd="0" presId="urn:microsoft.com/office/officeart/2005/8/layout/default"/>
-    <dgm:cxn modelId="{994F80C6-F143-4C62-913E-3B3E4D90E298}" srcId="{86C549A0-F570-4109-BFD2-0C92488BEF98}" destId="{0A0BE87A-6222-400B-A688-3EF4C22E4848}" srcOrd="0" destOrd="0" parTransId="{B0A2FFD6-821A-44AB-96D5-8641E415B7A7}" sibTransId="{89AFA317-265C-4778-8748-BE9E1497F99F}"/>
-    <dgm:cxn modelId="{79768B16-0E61-42FD-A9D7-2FF94EAC7076}" type="presOf" srcId="{0A0BE87A-6222-400B-A688-3EF4C22E4848}" destId="{A2F9A2B0-39F2-4BD8-B63C-367639B1161D}" srcOrd="0" destOrd="0" presId="urn:microsoft.com/office/officeart/2005/8/layout/default"/>
-    <dgm:cxn modelId="{8A55B4E8-3E7F-4467-896C-DEE7AB8DEB99}" srcId="{0A0BE87A-6222-400B-A688-3EF4C22E4848}" destId="{06DDB75B-D4E4-4197-A140-1E63F54A39CB}" srcOrd="0" destOrd="0" parTransId="{BE621C5F-488A-4EA9-A53D-F77179400547}" sibTransId="{19F191F9-A400-415F-8D79-41FE53170B73}"/>
-    <dgm:cxn modelId="{819B6C46-A070-49ED-BF5E-B11233E21D56}" type="presOf" srcId="{9F4234E8-7EBD-4A9D-958F-275F8D76BF30}" destId="{8EA95343-D1E9-4DEE-AE47-AA63EF966FAF}" srcOrd="0" destOrd="0" presId="urn:microsoft.com/office/officeart/2005/8/layout/default"/>
+    <dgm:cxn modelId="{E08B3B8A-1BA8-4C35-837E-E6ABAF9E6085}" type="presOf" srcId="{86C549A0-F570-4109-BFD2-0C92488BEF98}" destId="{3574C539-1F79-4EA4-AD8F-08ACB4CAC45B}" srcOrd="0" destOrd="0" presId="urn:microsoft.com/office/officeart/2005/8/layout/default"/>
+    <dgm:cxn modelId="{5B358D0D-AA0E-4876-A22D-6E607EC30D89}" srcId="{DD1D4123-2CCC-4FF6-A5A7-7D4D15F747AF}" destId="{05D03E3C-E725-426F-A91C-AECE9FA8AD74}" srcOrd="0" destOrd="0" parTransId="{4CA9D212-1E83-4A16-A463-2FD30C2F8A74}" sibTransId="{DEA0D0C2-A383-48F5-B930-99E0C41DFBAC}"/>
+    <dgm:cxn modelId="{AC638474-4F06-4BF8-BECF-84513DB7457E}" type="presOf" srcId="{F527DBF7-6F16-4711-B422-9646B4CB2F8A}" destId="{9A9DDF8B-2E83-4361-B594-08AF6280F78B}" srcOrd="0" destOrd="0" presId="urn:microsoft.com/office/officeart/2005/8/layout/default"/>
+    <dgm:cxn modelId="{CBE941A8-E076-487B-B6BF-8151A8B69D2A}" srcId="{86C549A0-F570-4109-BFD2-0C92488BEF98}" destId="{F527DBF7-6F16-4711-B422-9646B4CB2F8A}" srcOrd="3" destOrd="0" parTransId="{DECD9EEB-77F5-42FD-87A7-8655FED130A5}" sibTransId="{E630CAC3-B01D-4126-A175-072ED449D2CF}"/>
     <dgm:cxn modelId="{339E4074-757E-4EFA-A342-C0A30BFAC5DD}" srcId="{F527DBF7-6F16-4711-B422-9646B4CB2F8A}" destId="{70C13FE4-A81E-4084-BA9E-ACE1128921AC}" srcOrd="0" destOrd="0" parTransId="{DBA63C29-2F6F-4A8A-99F7-8AB34521A3A5}" sibTransId="{38B44BD2-42A4-4D76-83CA-A5854AB935EC}"/>
-    <dgm:cxn modelId="{AC638474-4F06-4BF8-BECF-84513DB7457E}" type="presOf" srcId="{F527DBF7-6F16-4711-B422-9646B4CB2F8A}" destId="{9A9DDF8B-2E83-4361-B594-08AF6280F78B}" srcOrd="0" destOrd="0" presId="urn:microsoft.com/office/officeart/2005/8/layout/default"/>
     <dgm:cxn modelId="{CCB0401B-244D-4B9B-A1FA-A41C8A075FF7}" type="presParOf" srcId="{3574C539-1F79-4EA4-AD8F-08ACB4CAC45B}" destId="{A2F9A2B0-39F2-4BD8-B63C-367639B1161D}" srcOrd="0" destOrd="0" presId="urn:microsoft.com/office/officeart/2005/8/layout/default"/>
     <dgm:cxn modelId="{51170150-83DE-4A33-91F0-4CB2CCD5FC60}" type="presParOf" srcId="{3574C539-1F79-4EA4-AD8F-08ACB4CAC45B}" destId="{C34B28FE-965A-4346-A167-1A9B89F3818F}" srcOrd="1" destOrd="0" presId="urn:microsoft.com/office/officeart/2005/8/layout/default"/>
     <dgm:cxn modelId="{F2A0AD7C-53E2-460B-A2DA-066FCB970EF2}" type="presParOf" srcId="{3574C539-1F79-4EA4-AD8F-08ACB4CAC45B}" destId="{30333E51-4182-4E1D-A173-11357FBD5130}" srcOrd="2" destOrd="0" presId="urn:microsoft.com/office/officeart/2005/8/layout/default"/>
@@ -4463,6 +4550,13 @@
         </dgm:presLayoutVars>
       </dgm:prSet>
       <dgm:spPr/>
+      <dgm:t>
+        <a:bodyPr/>
+        <a:lstStyle/>
+        <a:p>
+          <a:endParaRPr lang="en-US"/>
+        </a:p>
+      </dgm:t>
     </dgm:pt>
     <dgm:pt modelId="{B49F8F47-9423-45BB-A42D-03762A8116C0}" type="pres">
       <dgm:prSet presAssocID="{27379ABE-77E9-4CDC-A96E-9D590B1CDE8A}" presName="parentText" presStyleLbl="node1" presStyleIdx="0" presStyleCnt="4">
@@ -4472,6 +4566,13 @@
         </dgm:presLayoutVars>
       </dgm:prSet>
       <dgm:spPr/>
+      <dgm:t>
+        <a:bodyPr/>
+        <a:lstStyle/>
+        <a:p>
+          <a:endParaRPr lang="en-US"/>
+        </a:p>
+      </dgm:t>
     </dgm:pt>
     <dgm:pt modelId="{B5FE1DE9-7390-4A63-A6E3-766E896890A0}" type="pres">
       <dgm:prSet presAssocID="{27379ABE-77E9-4CDC-A96E-9D590B1CDE8A}" presName="childText" presStyleLbl="revTx" presStyleIdx="0" presStyleCnt="3">
@@ -4480,6 +4581,13 @@
         </dgm:presLayoutVars>
       </dgm:prSet>
       <dgm:spPr/>
+      <dgm:t>
+        <a:bodyPr/>
+        <a:lstStyle/>
+        <a:p>
+          <a:endParaRPr lang="en-US"/>
+        </a:p>
+      </dgm:t>
     </dgm:pt>
     <dgm:pt modelId="{837EB564-E720-4BF4-8825-E361E9E2F680}" type="pres">
       <dgm:prSet presAssocID="{39A6C3DB-F43B-4FEF-B933-925DF991C5E0}" presName="parentText" presStyleLbl="node1" presStyleIdx="1" presStyleCnt="4">
@@ -4489,6 +4597,13 @@
         </dgm:presLayoutVars>
       </dgm:prSet>
       <dgm:spPr/>
+      <dgm:t>
+        <a:bodyPr/>
+        <a:lstStyle/>
+        <a:p>
+          <a:endParaRPr lang="en-US"/>
+        </a:p>
+      </dgm:t>
     </dgm:pt>
     <dgm:pt modelId="{6948EB1D-E459-4B92-AE33-DE3E0C67437C}" type="pres">
       <dgm:prSet presAssocID="{39A6C3DB-F43B-4FEF-B933-925DF991C5E0}" presName="childText" presStyleLbl="revTx" presStyleIdx="1" presStyleCnt="3">
@@ -4554,21 +4669,21 @@
     </dgm:pt>
   </dgm:ptLst>
   <dgm:cxnLst>
+    <dgm:cxn modelId="{521CB444-E60F-441B-9D20-0E4E5F13E8F3}" srcId="{27379ABE-77E9-4CDC-A96E-9D590B1CDE8A}" destId="{C24F0CA3-E8AC-4FF7-85EE-7C4705374345}" srcOrd="0" destOrd="0" parTransId="{960C28A1-00C4-43F6-880B-441F78603A3C}" sibTransId="{0C400747-9500-4BDA-86D3-F1CC026C228E}"/>
+    <dgm:cxn modelId="{1BB5B894-FC8B-4F3F-9166-1DC0FD4F1EC5}" srcId="{08CE794D-44EE-4979-AA43-B815C8011F5E}" destId="{F2480588-B434-4B47-B346-BDEB207B3508}" srcOrd="2" destOrd="0" parTransId="{F808377D-E443-4DBD-AAA0-BF2E45779E1F}" sibTransId="{12FDFF9F-BBB3-492E-9F5F-034C791F8BB3}"/>
+    <dgm:cxn modelId="{1C9B932C-4FEC-418B-AD52-BE9173A0B1B8}" type="presOf" srcId="{08CE794D-44EE-4979-AA43-B815C8011F5E}" destId="{28B61413-2CBE-4321-AFD8-27EC0ADAEB03}" srcOrd="0" destOrd="0" presId="urn:microsoft.com/office/officeart/2005/8/layout/vList2"/>
+    <dgm:cxn modelId="{4A8012E5-811F-4634-BD5B-E617F7C9678A}" type="presOf" srcId="{39A6C3DB-F43B-4FEF-B933-925DF991C5E0}" destId="{837EB564-E720-4BF4-8825-E361E9E2F680}" srcOrd="0" destOrd="0" presId="urn:microsoft.com/office/officeart/2005/8/layout/vList2"/>
+    <dgm:cxn modelId="{2BCB3F7F-260B-4DA2-B0D6-AC2CCB65F2EB}" type="presOf" srcId="{97CBF15D-7036-44F1-8015-6E78CB3FDB43}" destId="{6948EB1D-E459-4B92-AE33-DE3E0C67437C}" srcOrd="0" destOrd="0" presId="urn:microsoft.com/office/officeart/2005/8/layout/vList2"/>
+    <dgm:cxn modelId="{A292B77B-4EFB-4C30-B852-46E9DB7A4920}" type="presOf" srcId="{D1291D43-60A6-4313-B539-831B665289D3}" destId="{93A25F27-B886-44C9-95CB-C4A1BFF585D3}" srcOrd="0" destOrd="0" presId="urn:microsoft.com/office/officeart/2005/8/layout/vList2"/>
+    <dgm:cxn modelId="{3FA677C0-F8A2-48A8-8C5A-5972EFC70766}" srcId="{08CE794D-44EE-4979-AA43-B815C8011F5E}" destId="{27379ABE-77E9-4CDC-A96E-9D590B1CDE8A}" srcOrd="0" destOrd="0" parTransId="{7113B057-9C0F-4DB1-9C98-93E31AFAFDB2}" sibTransId="{59B4DA20-9EDF-412D-A1F6-78958C04626B}"/>
     <dgm:cxn modelId="{BE0C52BB-A073-4DB0-8B25-D3E56441FBB6}" type="presOf" srcId="{27379ABE-77E9-4CDC-A96E-9D590B1CDE8A}" destId="{B49F8F47-9423-45BB-A42D-03762A8116C0}" srcOrd="0" destOrd="0" presId="urn:microsoft.com/office/officeart/2005/8/layout/vList2"/>
+    <dgm:cxn modelId="{FC4E98AA-136F-4F8C-BC39-6B6A624CCBC2}" srcId="{08CE794D-44EE-4979-AA43-B815C8011F5E}" destId="{D1291D43-60A6-4313-B539-831B665289D3}" srcOrd="3" destOrd="0" parTransId="{CFDD7358-5250-4746-A63C-175296A18940}" sibTransId="{3BDA62AE-4013-4CD4-A0F8-AD28B1BECF27}"/>
+    <dgm:cxn modelId="{A3D18BEB-C32E-4171-931E-AD6EC59160A2}" srcId="{F2480588-B434-4B47-B346-BDEB207B3508}" destId="{8B371517-E11C-4C3D-BBE4-86A1A74CA2F8}" srcOrd="0" destOrd="0" parTransId="{568D96A2-1BA3-41D0-850B-7B6A0A9F539C}" sibTransId="{2DD62B4B-07B4-4688-A91A-306496DAD3BF}"/>
     <dgm:cxn modelId="{40D0299B-6836-43AC-AE58-BD3EE1B8BCC5}" type="presOf" srcId="{8B371517-E11C-4C3D-BBE4-86A1A74CA2F8}" destId="{B9965C6A-FEA3-49B9-9BC6-2A938AA0F8F2}" srcOrd="0" destOrd="0" presId="urn:microsoft.com/office/officeart/2005/8/layout/vList2"/>
-    <dgm:cxn modelId="{A3D18BEB-C32E-4171-931E-AD6EC59160A2}" srcId="{F2480588-B434-4B47-B346-BDEB207B3508}" destId="{8B371517-E11C-4C3D-BBE4-86A1A74CA2F8}" srcOrd="0" destOrd="0" parTransId="{568D96A2-1BA3-41D0-850B-7B6A0A9F539C}" sibTransId="{2DD62B4B-07B4-4688-A91A-306496DAD3BF}"/>
-    <dgm:cxn modelId="{3FA677C0-F8A2-48A8-8C5A-5972EFC70766}" srcId="{08CE794D-44EE-4979-AA43-B815C8011F5E}" destId="{27379ABE-77E9-4CDC-A96E-9D590B1CDE8A}" srcOrd="0" destOrd="0" parTransId="{7113B057-9C0F-4DB1-9C98-93E31AFAFDB2}" sibTransId="{59B4DA20-9EDF-412D-A1F6-78958C04626B}"/>
-    <dgm:cxn modelId="{A292B77B-4EFB-4C30-B852-46E9DB7A4920}" type="presOf" srcId="{D1291D43-60A6-4313-B539-831B665289D3}" destId="{93A25F27-B886-44C9-95CB-C4A1BFF585D3}" srcOrd="0" destOrd="0" presId="urn:microsoft.com/office/officeart/2005/8/layout/vList2"/>
-    <dgm:cxn modelId="{4A8012E5-811F-4634-BD5B-E617F7C9678A}" type="presOf" srcId="{39A6C3DB-F43B-4FEF-B933-925DF991C5E0}" destId="{837EB564-E720-4BF4-8825-E361E9E2F680}" srcOrd="0" destOrd="0" presId="urn:microsoft.com/office/officeart/2005/8/layout/vList2"/>
+    <dgm:cxn modelId="{04899BFA-91E2-43A2-96A3-1A18A340102A}" srcId="{08CE794D-44EE-4979-AA43-B815C8011F5E}" destId="{39A6C3DB-F43B-4FEF-B933-925DF991C5E0}" srcOrd="1" destOrd="0" parTransId="{E05C015E-B45D-415B-B0ED-3A4790463467}" sibTransId="{ED137E2E-1B87-4C55-BCBE-7B944B8E0975}"/>
+    <dgm:cxn modelId="{3F2031EF-DA1B-4077-8C29-8569AB86627E}" srcId="{39A6C3DB-F43B-4FEF-B933-925DF991C5E0}" destId="{97CBF15D-7036-44F1-8015-6E78CB3FDB43}" srcOrd="0" destOrd="0" parTransId="{F4C6A53A-D97A-4A94-B592-F0BE3DA8169F}" sibTransId="{D0FDDFC8-A133-4CCF-B5A0-EEFF67D41049}"/>
+    <dgm:cxn modelId="{71FE820C-B93C-4C28-9870-B03A4D53F91A}" type="presOf" srcId="{C24F0CA3-E8AC-4FF7-85EE-7C4705374345}" destId="{B5FE1DE9-7390-4A63-A6E3-766E896890A0}" srcOrd="0" destOrd="0" presId="urn:microsoft.com/office/officeart/2005/8/layout/vList2"/>
     <dgm:cxn modelId="{C5F55069-089A-46D5-B1CB-E6B68E9B2139}" type="presOf" srcId="{F2480588-B434-4B47-B346-BDEB207B3508}" destId="{532A6553-E2F2-4585-9F7C-4CA62694FCEE}" srcOrd="0" destOrd="0" presId="urn:microsoft.com/office/officeart/2005/8/layout/vList2"/>
-    <dgm:cxn modelId="{71FE820C-B93C-4C28-9870-B03A4D53F91A}" type="presOf" srcId="{C24F0CA3-E8AC-4FF7-85EE-7C4705374345}" destId="{B5FE1DE9-7390-4A63-A6E3-766E896890A0}" srcOrd="0" destOrd="0" presId="urn:microsoft.com/office/officeart/2005/8/layout/vList2"/>
-    <dgm:cxn modelId="{2BCB3F7F-260B-4DA2-B0D6-AC2CCB65F2EB}" type="presOf" srcId="{97CBF15D-7036-44F1-8015-6E78CB3FDB43}" destId="{6948EB1D-E459-4B92-AE33-DE3E0C67437C}" srcOrd="0" destOrd="0" presId="urn:microsoft.com/office/officeart/2005/8/layout/vList2"/>
-    <dgm:cxn modelId="{521CB444-E60F-441B-9D20-0E4E5F13E8F3}" srcId="{27379ABE-77E9-4CDC-A96E-9D590B1CDE8A}" destId="{C24F0CA3-E8AC-4FF7-85EE-7C4705374345}" srcOrd="0" destOrd="0" parTransId="{960C28A1-00C4-43F6-880B-441F78603A3C}" sibTransId="{0C400747-9500-4BDA-86D3-F1CC026C228E}"/>
-    <dgm:cxn modelId="{FC4E98AA-136F-4F8C-BC39-6B6A624CCBC2}" srcId="{08CE794D-44EE-4979-AA43-B815C8011F5E}" destId="{D1291D43-60A6-4313-B539-831B665289D3}" srcOrd="3" destOrd="0" parTransId="{CFDD7358-5250-4746-A63C-175296A18940}" sibTransId="{3BDA62AE-4013-4CD4-A0F8-AD28B1BECF27}"/>
-    <dgm:cxn modelId="{1C9B932C-4FEC-418B-AD52-BE9173A0B1B8}" type="presOf" srcId="{08CE794D-44EE-4979-AA43-B815C8011F5E}" destId="{28B61413-2CBE-4321-AFD8-27EC0ADAEB03}" srcOrd="0" destOrd="0" presId="urn:microsoft.com/office/officeart/2005/8/layout/vList2"/>
-    <dgm:cxn modelId="{1BB5B894-FC8B-4F3F-9166-1DC0FD4F1EC5}" srcId="{08CE794D-44EE-4979-AA43-B815C8011F5E}" destId="{F2480588-B434-4B47-B346-BDEB207B3508}" srcOrd="2" destOrd="0" parTransId="{F808377D-E443-4DBD-AAA0-BF2E45779E1F}" sibTransId="{12FDFF9F-BBB3-492E-9F5F-034C791F8BB3}"/>
-    <dgm:cxn modelId="{3F2031EF-DA1B-4077-8C29-8569AB86627E}" srcId="{39A6C3DB-F43B-4FEF-B933-925DF991C5E0}" destId="{97CBF15D-7036-44F1-8015-6E78CB3FDB43}" srcOrd="0" destOrd="0" parTransId="{F4C6A53A-D97A-4A94-B592-F0BE3DA8169F}" sibTransId="{D0FDDFC8-A133-4CCF-B5A0-EEFF67D41049}"/>
-    <dgm:cxn modelId="{04899BFA-91E2-43A2-96A3-1A18A340102A}" srcId="{08CE794D-44EE-4979-AA43-B815C8011F5E}" destId="{39A6C3DB-F43B-4FEF-B933-925DF991C5E0}" srcOrd="1" destOrd="0" parTransId="{E05C015E-B45D-415B-B0ED-3A4790463467}" sibTransId="{ED137E2E-1B87-4C55-BCBE-7B944B8E0975}"/>
     <dgm:cxn modelId="{B684196F-62EE-4DD6-995C-BA5306D5C7D2}" type="presParOf" srcId="{28B61413-2CBE-4321-AFD8-27EC0ADAEB03}" destId="{B49F8F47-9423-45BB-A42D-03762A8116C0}" srcOrd="0" destOrd="0" presId="urn:microsoft.com/office/officeart/2005/8/layout/vList2"/>
     <dgm:cxn modelId="{5C7BDFB4-9086-40D5-A308-0405D8965FE3}" type="presParOf" srcId="{28B61413-2CBE-4321-AFD8-27EC0ADAEB03}" destId="{B5FE1DE9-7390-4A63-A6E3-766E896890A0}" srcOrd="1" destOrd="0" presId="urn:microsoft.com/office/officeart/2005/8/layout/vList2"/>
     <dgm:cxn modelId="{E63EB0EA-E08C-40F9-9C14-749A6E609768}" type="presParOf" srcId="{28B61413-2CBE-4321-AFD8-27EC0ADAEB03}" destId="{837EB564-E720-4BF4-8825-E361E9E2F680}" srcOrd="2" destOrd="0" presId="urn:microsoft.com/office/officeart/2005/8/layout/vList2"/>
@@ -5126,6 +5241,13 @@
         </dgm:presLayoutVars>
       </dgm:prSet>
       <dgm:spPr/>
+      <dgm:t>
+        <a:bodyPr/>
+        <a:lstStyle/>
+        <a:p>
+          <a:endParaRPr lang="en-US"/>
+        </a:p>
+      </dgm:t>
     </dgm:pt>
     <dgm:pt modelId="{C0E5CDAB-CCC6-49DC-9228-702F5B20AB6B}" type="pres">
       <dgm:prSet presAssocID="{AF195146-31BB-476F-BA80-E45EA9F09AF6}" presName="node" presStyleLbl="node1" presStyleIdx="0" presStyleCnt="6">
@@ -5240,12 +5362,12 @@
   </dgm:ptLst>
   <dgm:cxnLst>
     <dgm:cxn modelId="{BFB03B2C-60F4-4341-99B3-FEF42FFBAFBE}" srcId="{AF195146-31BB-476F-BA80-E45EA9F09AF6}" destId="{1633A3CA-0855-44E4-917E-71B0D13C8838}" srcOrd="0" destOrd="0" parTransId="{53A6C240-9B83-4CA4-9746-AFC35317A960}" sibTransId="{87B581D1-C99D-4DAE-9FE1-4D3AF1475D92}"/>
+    <dgm:cxn modelId="{94B34A6A-96F1-4A8F-9865-3E3604EBD667}" srcId="{EAE661BC-6EDC-4089-83DE-8E5E84E19FBE}" destId="{904B9C02-ED17-46D8-BF52-A988320887FB}" srcOrd="0" destOrd="0" parTransId="{BF3C70EE-41B3-4925-A6C4-0631CA23DC4A}" sibTransId="{D86362F8-2123-4049-98E6-FD9DB8A0552F}"/>
     <dgm:cxn modelId="{142D0700-22AF-435C-9CC3-2DDF15C0EE3D}" type="presOf" srcId="{EAE661BC-6EDC-4089-83DE-8E5E84E19FBE}" destId="{E9A93D30-FD52-485F-9984-49636C6BBD2D}" srcOrd="0" destOrd="0" presId="urn:microsoft.com/office/officeart/2005/8/layout/default"/>
-    <dgm:cxn modelId="{94B34A6A-96F1-4A8F-9865-3E3604EBD667}" srcId="{EAE661BC-6EDC-4089-83DE-8E5E84E19FBE}" destId="{904B9C02-ED17-46D8-BF52-A988320887FB}" srcOrd="0" destOrd="0" parTransId="{BF3C70EE-41B3-4925-A6C4-0631CA23DC4A}" sibTransId="{D86362F8-2123-4049-98E6-FD9DB8A0552F}"/>
+    <dgm:cxn modelId="{C1BFFF89-247A-4C46-9083-E360691C2669}" srcId="{86B5168C-97BE-48B9-B3AD-8ACE8CCACA1A}" destId="{31004150-4DC5-438A-A720-E4AE5DE4BF1A}" srcOrd="5" destOrd="0" parTransId="{081D9C26-AC00-4240-B0D5-20C2B07C883C}" sibTransId="{B0FD892B-84C8-474F-AE42-55E2CE80B1B5}"/>
     <dgm:cxn modelId="{B1968713-2CF8-40E9-8B35-2A9AB8D4E7A7}" type="presOf" srcId="{88423057-64F6-4312-87DD-641E00F3EAD5}" destId="{CCD73713-8839-4B70-AA45-9E7004C55895}" srcOrd="0" destOrd="1" presId="urn:microsoft.com/office/officeart/2005/8/layout/default"/>
     <dgm:cxn modelId="{A39714BD-90F5-4B3F-8A14-FD5E9EEAC939}" srcId="{31004150-4DC5-438A-A720-E4AE5DE4BF1A}" destId="{4310EF3A-D638-4E1A-BD05-C4873E7D0FF3}" srcOrd="0" destOrd="0" parTransId="{4F18613B-E28B-4F97-AD81-D640C20BB370}" sibTransId="{6E60685A-50CE-4CF6-8379-7EC54C40BC5A}"/>
     <dgm:cxn modelId="{292DC170-B05F-4095-842D-7CB37B2B225D}" type="presOf" srcId="{31004150-4DC5-438A-A720-E4AE5DE4BF1A}" destId="{4DDD00E4-943F-4E99-80CB-04C4F641E40C}" srcOrd="0" destOrd="0" presId="urn:microsoft.com/office/officeart/2005/8/layout/default"/>
-    <dgm:cxn modelId="{C1BFFF89-247A-4C46-9083-E360691C2669}" srcId="{86B5168C-97BE-48B9-B3AD-8ACE8CCACA1A}" destId="{31004150-4DC5-438A-A720-E4AE5DE4BF1A}" srcOrd="5" destOrd="0" parTransId="{081D9C26-AC00-4240-B0D5-20C2B07C883C}" sibTransId="{B0FD892B-84C8-474F-AE42-55E2CE80B1B5}"/>
     <dgm:cxn modelId="{30D5DBC3-754A-4441-9F12-FA81A6DADA51}" type="presOf" srcId="{EB60860B-93A2-4C5C-8B9D-22634C7B8A97}" destId="{4DDD00E4-943F-4E99-80CB-04C4F641E40C}" srcOrd="0" destOrd="2" presId="urn:microsoft.com/office/officeart/2005/8/layout/default"/>
     <dgm:cxn modelId="{4ED0D942-2048-4020-A556-9D906FC4D1F6}" srcId="{86B5168C-97BE-48B9-B3AD-8ACE8CCACA1A}" destId="{913C32CC-0BB0-43C4-AC7A-BB3A687530CE}" srcOrd="4" destOrd="0" parTransId="{2088E97D-62AB-4559-BD86-C68A63B25FFE}" sibTransId="{A5D80E38-4A6F-485B-B4C5-FDAEFD19D951}"/>
     <dgm:cxn modelId="{7BE39785-C054-42F0-82D3-F0FE46BF5365}" srcId="{86B5168C-97BE-48B9-B3AD-8ACE8CCACA1A}" destId="{AF195146-31BB-476F-BA80-E45EA9F09AF6}" srcOrd="0" destOrd="0" parTransId="{50081A90-4D9E-4AC8-A8E5-0D1155F2B64A}" sibTransId="{FE53BEC2-5724-40D0-B439-E75073CA7DDA}"/>
@@ -5262,8 +5384,8 @@
     <dgm:cxn modelId="{ECB50024-CD81-4852-AA26-5F18EBBFADCB}" srcId="{31004150-4DC5-438A-A720-E4AE5DE4BF1A}" destId="{EB60860B-93A2-4C5C-8B9D-22634C7B8A97}" srcOrd="1" destOrd="0" parTransId="{E64337D2-1E4B-4023-9393-59EC5BDEA4D2}" sibTransId="{4216658B-A72E-47A2-9F2B-62592CE74AF7}"/>
     <dgm:cxn modelId="{80757E9B-24C7-46BD-B5D7-D1989D770959}" srcId="{86B5168C-97BE-48B9-B3AD-8ACE8CCACA1A}" destId="{D22399FB-76B8-4672-9558-AA22C26FE71A}" srcOrd="2" destOrd="0" parTransId="{E8070FDF-6DEA-4A0D-A50C-D5D02832B797}" sibTransId="{29927244-E245-42E4-B364-4C78464528B2}"/>
     <dgm:cxn modelId="{4EBEE693-33EA-4230-9D64-5A2FA63E4FFE}" srcId="{86B5168C-97BE-48B9-B3AD-8ACE8CCACA1A}" destId="{EAE661BC-6EDC-4089-83DE-8E5E84E19FBE}" srcOrd="1" destOrd="0" parTransId="{B8293940-4511-4E3E-8DCF-1E568CA655FD}" sibTransId="{B17D1512-3C6B-4201-91E1-3CEBD9786571}"/>
+    <dgm:cxn modelId="{4881C53E-D933-46CC-B397-0D4727BFA299}" type="presOf" srcId="{86B5168C-97BE-48B9-B3AD-8ACE8CCACA1A}" destId="{852A0ACD-65E8-4FC7-A879-ED9817785A7C}" srcOrd="0" destOrd="0" presId="urn:microsoft.com/office/officeart/2005/8/layout/default"/>
     <dgm:cxn modelId="{2D217CAA-05EB-4A84-9FC9-BD510A9E8828}" srcId="{502B7042-91B0-4FDE-9D97-AE5F77FC03EC}" destId="{7DCFF091-3D09-4FB7-B5E4-908BD7BAE3BB}" srcOrd="0" destOrd="0" parTransId="{C56887DF-666E-47C2-8E62-0FFE08578D2B}" sibTransId="{1435D8F0-38D5-494C-9250-C19175AF0A81}"/>
-    <dgm:cxn modelId="{4881C53E-D933-46CC-B397-0D4727BFA299}" type="presOf" srcId="{86B5168C-97BE-48B9-B3AD-8ACE8CCACA1A}" destId="{852A0ACD-65E8-4FC7-A879-ED9817785A7C}" srcOrd="0" destOrd="0" presId="urn:microsoft.com/office/officeart/2005/8/layout/default"/>
     <dgm:cxn modelId="{A466E315-0BB5-4AE4-882F-453572BF6350}" type="presOf" srcId="{913C32CC-0BB0-43C4-AC7A-BB3A687530CE}" destId="{CCD73713-8839-4B70-AA45-9E7004C55895}" srcOrd="0" destOrd="0" presId="urn:microsoft.com/office/officeart/2005/8/layout/default"/>
     <dgm:cxn modelId="{D2D2C445-5BFF-4707-BA63-3E1A0B594137}" type="presOf" srcId="{4310EF3A-D638-4E1A-BD05-C4873E7D0FF3}" destId="{4DDD00E4-943F-4E99-80CB-04C4F641E40C}" srcOrd="0" destOrd="1" presId="urn:microsoft.com/office/officeart/2005/8/layout/default"/>
     <dgm:cxn modelId="{BDB6D9E0-EBC2-462B-B6A2-5DA7A0E32814}" type="presParOf" srcId="{852A0ACD-65E8-4FC7-A879-ED9817785A7C}" destId="{C0E5CDAB-CCC6-49DC-9228-702F5B20AB6B}" srcOrd="0" destOrd="0" presId="urn:microsoft.com/office/officeart/2005/8/layout/default"/>
@@ -5303,7 +5425,7 @@
       </dsp:nvSpPr>
       <dsp:spPr>
         <a:xfrm>
-          <a:off x="0" y="228649"/>
+          <a:off x="0" y="228227"/>
           <a:ext cx="2486760" cy="495000"/>
         </a:xfrm>
         <a:prstGeom prst="rect">
@@ -5352,7 +5474,7 @@
         </a:p>
       </dsp:txBody>
       <dsp:txXfrm>
-        <a:off x="0" y="228649"/>
+        <a:off x="0" y="228227"/>
         <a:ext cx="2486760" cy="495000"/>
       </dsp:txXfrm>
     </dsp:sp>
@@ -5363,7 +5485,7 @@
       </dsp:nvSpPr>
       <dsp:spPr>
         <a:xfrm>
-          <a:off x="2486760" y="4353"/>
+          <a:off x="2486760" y="3931"/>
           <a:ext cx="497352" cy="943593"/>
         </a:xfrm>
         <a:prstGeom prst="leftBrace">
@@ -5407,7 +5529,7 @@
       </dsp:nvSpPr>
       <dsp:spPr>
         <a:xfrm>
-          <a:off x="3183053" y="4353"/>
+          <a:off x="3183053" y="3931"/>
           <a:ext cx="6763989" cy="943593"/>
         </a:xfrm>
         <a:prstGeom prst="rect">
@@ -5510,7 +5632,7 @@
         </a:p>
       </dsp:txBody>
       <dsp:txXfrm>
-        <a:off x="3183053" y="4353"/>
+        <a:off x="3183053" y="3931"/>
         <a:ext cx="6763989" cy="943593"/>
       </dsp:txXfrm>
     </dsp:sp>
@@ -5521,7 +5643,7 @@
       </dsp:nvSpPr>
       <dsp:spPr>
         <a:xfrm>
-          <a:off x="0" y="1231306"/>
+          <a:off x="0" y="1230884"/>
           <a:ext cx="2486760" cy="495000"/>
         </a:xfrm>
         <a:prstGeom prst="rect">
@@ -5570,7 +5692,7 @@
         </a:p>
       </dsp:txBody>
       <dsp:txXfrm>
-        <a:off x="0" y="1231306"/>
+        <a:off x="0" y="1230884"/>
         <a:ext cx="2486760" cy="495000"/>
       </dsp:txXfrm>
     </dsp:sp>
@@ -5581,7 +5703,7 @@
       </dsp:nvSpPr>
       <dsp:spPr>
         <a:xfrm>
-          <a:off x="2486760" y="1037946"/>
+          <a:off x="2486760" y="1037524"/>
           <a:ext cx="497352" cy="881718"/>
         </a:xfrm>
         <a:prstGeom prst="leftBrace">
@@ -5625,7 +5747,7 @@
       </dsp:nvSpPr>
       <dsp:spPr>
         <a:xfrm>
-          <a:off x="3183053" y="1037946"/>
+          <a:off x="3183053" y="1037524"/>
           <a:ext cx="6763989" cy="881718"/>
         </a:xfrm>
         <a:prstGeom prst="rect">
@@ -5709,7 +5831,7 @@
         </a:p>
       </dsp:txBody>
       <dsp:txXfrm>
-        <a:off x="3183053" y="1037946"/>
+        <a:off x="3183053" y="1037524"/>
         <a:ext cx="6763989" cy="881718"/>
       </dsp:txXfrm>
     </dsp:sp>
@@ -5720,7 +5842,7 @@
       </dsp:nvSpPr>
       <dsp:spPr>
         <a:xfrm>
-          <a:off x="0" y="2073715"/>
+          <a:off x="0" y="2073293"/>
           <a:ext cx="2484332" cy="819843"/>
         </a:xfrm>
         <a:prstGeom prst="rect">
@@ -5769,7 +5891,7 @@
         </a:p>
       </dsp:txBody>
       <dsp:txXfrm>
-        <a:off x="0" y="2073715"/>
+        <a:off x="0" y="2073293"/>
         <a:ext cx="2484332" cy="819843"/>
       </dsp:txXfrm>
     </dsp:sp>
@@ -5780,7 +5902,7 @@
       </dsp:nvSpPr>
       <dsp:spPr>
         <a:xfrm>
-          <a:off x="2484332" y="2009665"/>
+          <a:off x="2484332" y="2009243"/>
           <a:ext cx="496866" cy="947944"/>
         </a:xfrm>
         <a:prstGeom prst="leftBrace">
@@ -5824,7 +5946,7 @@
       </dsp:nvSpPr>
       <dsp:spPr>
         <a:xfrm>
-          <a:off x="3179945" y="2009665"/>
+          <a:off x="3179945" y="2009243"/>
           <a:ext cx="6757383" cy="947944"/>
         </a:xfrm>
         <a:prstGeom prst="rect">
@@ -5927,7 +6049,7 @@
         </a:p>
       </dsp:txBody>
       <dsp:txXfrm>
-        <a:off x="3179945" y="2009665"/>
+        <a:off x="3179945" y="2009243"/>
         <a:ext cx="6757383" cy="947944"/>
       </dsp:txXfrm>
     </dsp:sp>
@@ -5938,7 +6060,7 @@
       </dsp:nvSpPr>
       <dsp:spPr>
         <a:xfrm>
-          <a:off x="0" y="3449797"/>
+          <a:off x="0" y="3604062"/>
           <a:ext cx="2484332" cy="495000"/>
         </a:xfrm>
         <a:prstGeom prst="rect">
@@ -5987,7 +6109,7 @@
         </a:p>
       </dsp:txBody>
       <dsp:txXfrm>
-        <a:off x="0" y="3449797"/>
+        <a:off x="0" y="3604062"/>
         <a:ext cx="2484332" cy="495000"/>
       </dsp:txXfrm>
     </dsp:sp>
@@ -5998,8 +6120,8 @@
       </dsp:nvSpPr>
       <dsp:spPr>
         <a:xfrm>
-          <a:off x="2484332" y="3047609"/>
-          <a:ext cx="496866" cy="1299375"/>
+          <a:off x="2484332" y="3047187"/>
+          <a:ext cx="496866" cy="1608750"/>
         </a:xfrm>
         <a:prstGeom prst="leftBrace">
           <a:avLst>
@@ -6042,8 +6164,8 @@
       </dsp:nvSpPr>
       <dsp:spPr>
         <a:xfrm>
-          <a:off x="3179945" y="3047609"/>
-          <a:ext cx="6757383" cy="1299375"/>
+          <a:off x="3179945" y="3047187"/>
+          <a:ext cx="6757383" cy="1608750"/>
         </a:xfrm>
         <a:prstGeom prst="rect">
           <a:avLst/>
@@ -6123,10 +6245,16 @@
             <a:t>Handled by a </a:t>
           </a:r>
           <a:r>
-            <a:rPr lang="en-US" sz="2500" kern="1200" dirty="0" err="1" smtClean="0"/>
+            <a:rPr lang="en-US" sz="2500" kern="1200" dirty="0" err="1" smtClean="0">
+              <a:latin typeface="Courier New" panose="02070309020205020404" pitchFamily="49" charset="0"/>
+              <a:cs typeface="Courier New" panose="02070309020205020404" pitchFamily="49" charset="0"/>
+            </a:rPr>
             <a:t>ScheduledExecutorService</a:t>
           </a:r>
-          <a:endParaRPr lang="en-US" sz="2500" kern="1200" dirty="0"/>
+          <a:endParaRPr lang="en-US" sz="2500" kern="1200" dirty="0">
+            <a:latin typeface="Courier New" panose="02070309020205020404" pitchFamily="49" charset="0"/>
+            <a:cs typeface="Courier New" panose="02070309020205020404" pitchFamily="49" charset="0"/>
+          </a:endParaRPr>
         </a:p>
         <a:p>
           <a:pPr marL="228600" lvl="1" indent="-228600" algn="l" defTabSz="1111250">
@@ -6149,8 +6277,8 @@
         </a:p>
       </dsp:txBody>
       <dsp:txXfrm>
-        <a:off x="3179945" y="3047609"/>
-        <a:ext cx="6757383" cy="1299375"/>
+        <a:off x="3179945" y="3047187"/>
+        <a:ext cx="6757383" cy="1608750"/>
       </dsp:txXfrm>
     </dsp:sp>
   </dsp:spTree>
@@ -6254,10 +6382,6 @@
             </a:rPr>
             <a:t>$SEUSERNAME</a:t>
           </a:r>
-          <a:endParaRPr lang="en-US" sz="2900" kern="1200" dirty="0" smtClean="0">
-            <a:latin typeface="Courier New" panose="02070309020205020404" pitchFamily="49" charset="0"/>
-            <a:cs typeface="Courier New" panose="02070309020205020404" pitchFamily="49" charset="0"/>
-          </a:endParaRPr>
         </a:p>
         <a:p>
           <a:pPr marL="228600" lvl="1" indent="-228600" algn="l" defTabSz="1022350">
@@ -6276,7 +6400,6 @@
             <a:rPr lang="en-US" sz="2300" kern="1200" dirty="0" smtClean="0"/>
             <a:t>Username to connect with</a:t>
           </a:r>
-          <a:endParaRPr lang="en-US" sz="2300" kern="1200" dirty="0" smtClean="0"/>
         </a:p>
       </dsp:txBody>
       <dsp:txXfrm>
@@ -6373,10 +6496,6 @@
             </a:rPr>
             <a:t>$SEPASSWORD:</a:t>
           </a:r>
-          <a:endParaRPr lang="en-US" sz="2900" kern="1200" dirty="0" smtClean="0">
-            <a:latin typeface="Courier New" panose="02070309020205020404" pitchFamily="49" charset="0"/>
-            <a:cs typeface="Courier New" panose="02070309020205020404" pitchFamily="49" charset="0"/>
-          </a:endParaRPr>
         </a:p>
         <a:p>
           <a:pPr marL="228600" lvl="1" indent="-228600" algn="l" defTabSz="1022350">
@@ -6395,7 +6514,6 @@
             <a:rPr lang="en-US" sz="2300" kern="1200" dirty="0" smtClean="0"/>
             <a:t>Password to connect with</a:t>
           </a:r>
-          <a:endParaRPr lang="en-US" sz="2300" kern="1200" dirty="0" smtClean="0"/>
         </a:p>
       </dsp:txBody>
       <dsp:txXfrm>
@@ -6492,10 +6610,6 @@
             </a:rPr>
             <a:t>$SEHOSTNAME:</a:t>
           </a:r>
-          <a:endParaRPr lang="en-US" sz="2900" kern="1200" dirty="0" smtClean="0">
-            <a:latin typeface="Courier New" panose="02070309020205020404" pitchFamily="49" charset="0"/>
-            <a:cs typeface="Courier New" panose="02070309020205020404" pitchFamily="49" charset="0"/>
-          </a:endParaRPr>
         </a:p>
         <a:p>
           <a:pPr marL="228600" lvl="1" indent="-228600" algn="l" defTabSz="1022350">
@@ -6514,7 +6628,6 @@
             <a:rPr lang="en-US" sz="2300" kern="1200" dirty="0" smtClean="0"/>
             <a:t>Hostname of the server</a:t>
           </a:r>
-          <a:endParaRPr lang="en-US" sz="2300" kern="1200" dirty="0" smtClean="0"/>
         </a:p>
       </dsp:txBody>
       <dsp:txXfrm>
@@ -12892,7 +13005,7 @@
             <a:fld id="{B61BEF0D-F0BB-DE4B-95CE-6DB70DBA9567}" type="datetimeFigureOut">
               <a:rPr lang="en-US" smtClean="0"/>
               <a:pPr/>
-              <a:t>2015-12-07</a:t>
+              <a:t>2015-12-08</a:t>
             </a:fld>
             <a:endParaRPr lang="en-US" dirty="0"/>
           </a:p>
@@ -13121,7 +13234,7 @@
           <a:p>
             <a:fld id="{55C6B4A9-1611-4792-9094-5F34BCA07E0B}" type="datetimeFigureOut">
               <a:rPr lang="en-US" smtClean="0"/>
-              <a:t>2015-12-07</a:t>
+              <a:t>2015-12-08</a:t>
             </a:fld>
             <a:endParaRPr lang="en-US" dirty="0"/>
           </a:p>
@@ -13302,7 +13415,7 @@
             <a:fld id="{B61BEF0D-F0BB-DE4B-95CE-6DB70DBA9567}" type="datetimeFigureOut">
               <a:rPr lang="en-US" smtClean="0"/>
               <a:pPr/>
-              <a:t>2015-12-07</a:t>
+              <a:t>2015-12-08</a:t>
             </a:fld>
             <a:endParaRPr lang="en-US" dirty="0"/>
           </a:p>
@@ -13473,7 +13586,7 @@
           <a:p>
             <a:fld id="{42A54C80-263E-416B-A8E0-580EDEADCBDC}" type="datetimeFigureOut">
               <a:rPr lang="en-US" smtClean="0"/>
-              <a:t>2015-12-07</a:t>
+              <a:t>2015-12-08</a:t>
             </a:fld>
             <a:endParaRPr lang="en-US" dirty="0"/>
           </a:p>
@@ -13728,7 +13841,7 @@
             <a:fld id="{B61BEF0D-F0BB-DE4B-95CE-6DB70DBA9567}" type="datetimeFigureOut">
               <a:rPr lang="en-US" smtClean="0"/>
               <a:pPr/>
-              <a:t>2015-12-07</a:t>
+              <a:t>2015-12-08</a:t>
             </a:fld>
             <a:endParaRPr lang="en-US" dirty="0"/>
           </a:p>
@@ -14055,7 +14168,7 @@
           <a:p>
             <a:fld id="{42A54C80-263E-416B-A8E0-580EDEADCBDC}" type="datetimeFigureOut">
               <a:rPr lang="en-US" smtClean="0"/>
-              <a:t>2015-12-07</a:t>
+              <a:t>2015-12-08</a:t>
             </a:fld>
             <a:endParaRPr lang="en-US" dirty="0"/>
           </a:p>
@@ -14507,7 +14620,7 @@
             <a:fld id="{B61BEF0D-F0BB-DE4B-95CE-6DB70DBA9567}" type="datetimeFigureOut">
               <a:rPr lang="en-US" smtClean="0"/>
               <a:pPr/>
-              <a:t>2015-12-07</a:t>
+              <a:t>2015-12-08</a:t>
             </a:fld>
             <a:endParaRPr lang="en-US" dirty="0"/>
           </a:p>
@@ -14627,7 +14740,7 @@
             <a:fld id="{B61BEF0D-F0BB-DE4B-95CE-6DB70DBA9567}" type="datetimeFigureOut">
               <a:rPr lang="en-US" smtClean="0"/>
               <a:pPr/>
-              <a:t>2015-12-07</a:t>
+              <a:t>2015-12-08</a:t>
             </a:fld>
             <a:endParaRPr lang="en-US" dirty="0"/>
           </a:p>
@@ -14724,7 +14837,7 @@
             <a:fld id="{B61BEF0D-F0BB-DE4B-95CE-6DB70DBA9567}" type="datetimeFigureOut">
               <a:rPr lang="en-US" smtClean="0"/>
               <a:pPr/>
-              <a:t>2015-12-07</a:t>
+              <a:t>2015-12-08</a:t>
             </a:fld>
             <a:endParaRPr lang="en-US" dirty="0"/>
           </a:p>
@@ -15012,7 +15125,7 @@
           <a:p>
             <a:fld id="{42A54C80-263E-416B-A8E0-580EDEADCBDC}" type="datetimeFigureOut">
               <a:rPr lang="en-US" smtClean="0"/>
-              <a:t>2015-12-07</a:t>
+              <a:t>2015-12-08</a:t>
             </a:fld>
             <a:endParaRPr lang="en-US" dirty="0"/>
           </a:p>
@@ -15335,7 +15448,7 @@
             <a:fld id="{B61BEF0D-F0BB-DE4B-95CE-6DB70DBA9567}" type="datetimeFigureOut">
               <a:rPr lang="en-US" smtClean="0"/>
               <a:pPr/>
-              <a:t>2015-12-07</a:t>
+              <a:t>2015-12-08</a:t>
             </a:fld>
             <a:endParaRPr lang="en-US" dirty="0"/>
           </a:p>
@@ -15591,7 +15704,7 @@
             <a:fld id="{B61BEF0D-F0BB-DE4B-95CE-6DB70DBA9567}" type="datetimeFigureOut">
               <a:rPr lang="en-US" smtClean="0"/>
               <a:pPr/>
-              <a:t>2015-12-07</a:t>
+              <a:t>2015-12-08</a:t>
             </a:fld>
             <a:endParaRPr lang="en-US" dirty="0"/>
           </a:p>
@@ -16097,7 +16210,15 @@
           <a:p>
             <a:r>
               <a:rPr lang="en-US" dirty="0" smtClean="0"/>
-              <a:t>Starvation Evasion Server</a:t>
+              <a:t>Starvation </a:t>
+            </a:r>
+            <a:r>
+              <a:rPr lang="en-US" dirty="0" smtClean="0"/>
+              <a:t>Evasion </a:t>
+            </a:r>
+            <a:r>
+              <a:rPr lang="en-US" dirty="0" smtClean="0"/>
+              <a:t>Server</a:t>
             </a:r>
             <a:endParaRPr lang="en-US" dirty="0"/>
           </a:p>
@@ -16203,14 +16324,14 @@
             <p:ph idx="1"/>
             <p:extLst>
               <p:ext uri="{D42A27DB-BD31-4B8C-83A1-F6EECF244321}">
-                <p14:modId xmlns:p14="http://schemas.microsoft.com/office/powerpoint/2010/main" val="4140792948"/>
+                <p14:modId xmlns:p14="http://schemas.microsoft.com/office/powerpoint/2010/main" val="908345454"/>
               </p:ext>
             </p:extLst>
           </p:nvPr>
         </p:nvGraphicFramePr>
         <p:xfrm>
-          <a:off x="810000" y="1828800"/>
-          <a:ext cx="9947043" cy="4351338"/>
+          <a:off x="810000" y="1828799"/>
+          <a:ext cx="9947043" cy="4659869"/>
         </p:xfrm>
         <a:graphic>
           <a:graphicData uri="http://schemas.openxmlformats.org/drawingml/2006/diagram">
@@ -16226,7 +16347,7 @@
         </p:nvSpPr>
         <p:spPr>
           <a:xfrm>
-            <a:off x="4937052" y="6488668"/>
+            <a:off x="5039788" y="6488668"/>
             <a:ext cx="5819991" cy="369332"/>
           </a:xfrm>
           <a:prstGeom prst="rect">

</xml_diff>

<commit_message>
Update server presentation formatting again
</commit_message>
<xml_diff>
--- a/doc/Starvation Evasion Server.pptx
+++ b/doc/Starvation Evasion Server.pptx
@@ -4,6 +4,9 @@
   <p:sldMasterIdLst>
     <p:sldMasterId id="2147483669" r:id="rId1"/>
   </p:sldMasterIdLst>
+  <p:notesMasterIdLst>
+    <p:notesMasterId r:id="rId9"/>
+  </p:notesMasterIdLst>
   <p:sldIdLst>
     <p:sldId id="256" r:id="rId2"/>
     <p:sldId id="257" r:id="rId3"/>
@@ -3498,15 +3501,15 @@
         <a:lstStyle/>
         <a:p>
           <a:r>
-            <a:rPr lang="en-US" dirty="0" smtClean="0"/>
-            <a:t>Handled by a </a:t>
-          </a:r>
-          <a:r>
             <a:rPr lang="en-US" dirty="0" err="1" smtClean="0">
               <a:latin typeface="Courier New" panose="02070309020205020404" pitchFamily="49" charset="0"/>
               <a:cs typeface="Courier New" panose="02070309020205020404" pitchFamily="49" charset="0"/>
             </a:rPr>
             <a:t>ScheduledExecutorService</a:t>
+          </a:r>
+          <a:r>
+            <a:rPr lang="en-US" dirty="0" smtClean="0"/>
+            <a:t>-controlled</a:t>
           </a:r>
           <a:endParaRPr lang="en-US" dirty="0">
             <a:latin typeface="Courier New" panose="02070309020205020404" pitchFamily="49" charset="0"/>
@@ -3791,7 +3794,7 @@
   <dgm:whole/>
   <dgm:extLst>
     <a:ext uri="http://schemas.microsoft.com/office/drawing/2008/diagram">
-      <dsp:dataModelExt xmlns:dsp="http://schemas.microsoft.com/office/drawing/2008/diagram" relId="rId6" minVer="http://schemas.openxmlformats.org/drawingml/2006/diagram"/>
+      <dsp:dataModelExt xmlns:dsp="http://schemas.microsoft.com/office/drawing/2008/diagram" relId="rId7" minVer="http://schemas.openxmlformats.org/drawingml/2006/diagram"/>
     </a:ext>
   </dgm:extLst>
 </dgm:dataModel>
@@ -4235,7 +4238,7 @@
   <dgm:whole/>
   <dgm:extLst>
     <a:ext uri="http://schemas.microsoft.com/office/drawing/2008/diagram">
-      <dsp:dataModelExt xmlns:dsp="http://schemas.microsoft.com/office/drawing/2008/diagram" relId="rId6" minVer="http://schemas.openxmlformats.org/drawingml/2006/diagram"/>
+      <dsp:dataModelExt xmlns:dsp="http://schemas.microsoft.com/office/drawing/2008/diagram" relId="rId7" minVer="http://schemas.openxmlformats.org/drawingml/2006/diagram"/>
     </a:ext>
   </dgm:extLst>
 </dgm:dataModel>
@@ -4696,7 +4699,7 @@
   <dgm:whole/>
   <dgm:extLst>
     <a:ext uri="http://schemas.microsoft.com/office/drawing/2008/diagram">
-      <dsp:dataModelExt xmlns:dsp="http://schemas.microsoft.com/office/drawing/2008/diagram" relId="rId6" minVer="http://schemas.openxmlformats.org/drawingml/2006/diagram"/>
+      <dsp:dataModelExt xmlns:dsp="http://schemas.microsoft.com/office/drawing/2008/diagram" relId="rId7" minVer="http://schemas.openxmlformats.org/drawingml/2006/diagram"/>
     </a:ext>
   </dgm:extLst>
 </dgm:dataModel>
@@ -5404,7 +5407,7 @@
   <dgm:whole/>
   <dgm:extLst>
     <a:ext uri="http://schemas.microsoft.com/office/drawing/2008/diagram">
-      <dsp:dataModelExt xmlns:dsp="http://schemas.microsoft.com/office/drawing/2008/diagram" relId="rId6" minVer="http://schemas.openxmlformats.org/drawingml/2006/diagram"/>
+      <dsp:dataModelExt xmlns:dsp="http://schemas.microsoft.com/office/drawing/2008/diagram" relId="rId7" minVer="http://schemas.openxmlformats.org/drawingml/2006/diagram"/>
     </a:ext>
   </dgm:extLst>
 </dgm:dataModel>
@@ -5425,8 +5428,8 @@
       </dsp:nvSpPr>
       <dsp:spPr>
         <a:xfrm>
-          <a:off x="0" y="228227"/>
-          <a:ext cx="2486760" cy="495000"/>
+          <a:off x="0" y="314586"/>
+          <a:ext cx="2486760" cy="514800"/>
         </a:xfrm>
         <a:prstGeom prst="rect">
           <a:avLst/>
@@ -5450,12 +5453,12 @@
         <a:fontRef idx="minor"/>
       </dsp:style>
       <dsp:txBody>
-        <a:bodyPr spcFirstLastPara="0" vert="horz" wrap="square" lIns="177800" tIns="63500" rIns="177800" bIns="63500" numCol="1" spcCol="1270" anchor="ctr" anchorCtr="0">
+        <a:bodyPr spcFirstLastPara="0" vert="horz" wrap="square" lIns="184912" tIns="66040" rIns="184912" bIns="66040" numCol="1" spcCol="1270" anchor="ctr" anchorCtr="0">
           <a:noAutofit/>
         </a:bodyPr>
         <a:lstStyle/>
         <a:p>
-          <a:pPr lvl="0" algn="r" defTabSz="1111250">
+          <a:pPr lvl="0" algn="r" defTabSz="1155700">
             <a:lnSpc>
               <a:spcPct val="90000"/>
             </a:lnSpc>
@@ -5467,15 +5470,15 @@
             </a:spcAft>
           </a:pPr>
           <a:r>
-            <a:rPr lang="en-US" sz="2500" kern="1200" dirty="0" smtClean="0"/>
+            <a:rPr lang="en-US" sz="2600" kern="1200" dirty="0" smtClean="0"/>
             <a:t>Main Thread</a:t>
           </a:r>
-          <a:endParaRPr lang="en-US" sz="2500" kern="1200" dirty="0"/>
+          <a:endParaRPr lang="en-US" sz="2600" kern="1200" dirty="0"/>
         </a:p>
       </dsp:txBody>
       <dsp:txXfrm>
-        <a:off x="0" y="228227"/>
-        <a:ext cx="2486760" cy="495000"/>
+        <a:off x="0" y="314586"/>
+        <a:ext cx="2486760" cy="514800"/>
       </dsp:txXfrm>
     </dsp:sp>
     <dsp:sp modelId="{87473130-C3D4-49DE-A7BC-3EAC449CA990}">
@@ -5485,8 +5488,8 @@
       </dsp:nvSpPr>
       <dsp:spPr>
         <a:xfrm>
-          <a:off x="2486760" y="3931"/>
-          <a:ext cx="497352" cy="943593"/>
+          <a:off x="2486760" y="81317"/>
+          <a:ext cx="497352" cy="981337"/>
         </a:xfrm>
         <a:prstGeom prst="leftBrace">
           <a:avLst>
@@ -5529,8 +5532,8 @@
       </dsp:nvSpPr>
       <dsp:spPr>
         <a:xfrm>
-          <a:off x="3183053" y="3931"/>
-          <a:ext cx="6763989" cy="943593"/>
+          <a:off x="3183053" y="81317"/>
+          <a:ext cx="6763989" cy="981337"/>
         </a:xfrm>
         <a:prstGeom prst="rect">
           <a:avLst/>
@@ -5588,12 +5591,12 @@
         </a:fontRef>
       </dsp:style>
       <dsp:txBody>
-        <a:bodyPr spcFirstLastPara="0" vert="horz" wrap="square" lIns="95250" tIns="95250" rIns="95250" bIns="95250" numCol="1" spcCol="1270" anchor="ctr" anchorCtr="0">
+        <a:bodyPr spcFirstLastPara="0" vert="horz" wrap="square" lIns="99060" tIns="99060" rIns="99060" bIns="99060" numCol="1" spcCol="1270" anchor="ctr" anchorCtr="0">
           <a:noAutofit/>
         </a:bodyPr>
         <a:lstStyle/>
         <a:p>
-          <a:pPr marL="228600" lvl="1" indent="-228600" algn="l" defTabSz="1111250">
+          <a:pPr marL="228600" lvl="1" indent="-228600" algn="l" defTabSz="1155700">
             <a:lnSpc>
               <a:spcPct val="90000"/>
             </a:lnSpc>
@@ -5606,13 +5609,13 @@
             <a:buChar char="••"/>
           </a:pPr>
           <a:r>
-            <a:rPr lang="en-US" sz="2500" kern="1200" dirty="0" smtClean="0"/>
+            <a:rPr lang="en-US" sz="2600" kern="1200" dirty="0" smtClean="0"/>
             <a:t>Initializes server threads</a:t>
           </a:r>
-          <a:endParaRPr lang="en-US" sz="2500" kern="1200" dirty="0"/>
+          <a:endParaRPr lang="en-US" sz="2600" kern="1200" dirty="0"/>
         </a:p>
         <a:p>
-          <a:pPr marL="228600" lvl="1" indent="-228600" algn="l" defTabSz="1111250">
+          <a:pPr marL="228600" lvl="1" indent="-228600" algn="l" defTabSz="1155700">
             <a:lnSpc>
               <a:spcPct val="90000"/>
             </a:lnSpc>
@@ -5625,15 +5628,15 @@
             <a:buChar char="••"/>
           </a:pPr>
           <a:r>
-            <a:rPr lang="en-US" sz="2500" kern="1200" dirty="0" smtClean="0"/>
+            <a:rPr lang="en-US" sz="2600" kern="1200" dirty="0" smtClean="0"/>
             <a:t>Listens for connections</a:t>
           </a:r>
-          <a:endParaRPr lang="en-US" sz="2500" kern="1200" dirty="0"/>
+          <a:endParaRPr lang="en-US" sz="2600" kern="1200" dirty="0"/>
         </a:p>
       </dsp:txBody>
       <dsp:txXfrm>
-        <a:off x="3183053" y="3931"/>
-        <a:ext cx="6763989" cy="943593"/>
+        <a:off x="3183053" y="81317"/>
+        <a:ext cx="6763989" cy="981337"/>
       </dsp:txXfrm>
     </dsp:sp>
     <dsp:sp modelId="{5E4A9645-7F28-402D-933E-B300E896188C}">
@@ -5643,8 +5646,8 @@
       </dsp:nvSpPr>
       <dsp:spPr>
         <a:xfrm>
-          <a:off x="0" y="1230884"/>
-          <a:ext cx="2486760" cy="495000"/>
+          <a:off x="0" y="1357349"/>
+          <a:ext cx="2486760" cy="514800"/>
         </a:xfrm>
         <a:prstGeom prst="rect">
           <a:avLst/>
@@ -5668,12 +5671,12 @@
         <a:fontRef idx="minor"/>
       </dsp:style>
       <dsp:txBody>
-        <a:bodyPr spcFirstLastPara="0" vert="horz" wrap="square" lIns="177800" tIns="63500" rIns="177800" bIns="63500" numCol="1" spcCol="1270" anchor="ctr" anchorCtr="0">
+        <a:bodyPr spcFirstLastPara="0" vert="horz" wrap="square" lIns="184912" tIns="66040" rIns="184912" bIns="66040" numCol="1" spcCol="1270" anchor="ctr" anchorCtr="0">
           <a:noAutofit/>
         </a:bodyPr>
         <a:lstStyle/>
         <a:p>
-          <a:pPr lvl="0" algn="r" defTabSz="1111250">
+          <a:pPr lvl="0" algn="r" defTabSz="1155700">
             <a:lnSpc>
               <a:spcPct val="90000"/>
             </a:lnSpc>
@@ -5685,15 +5688,15 @@
             </a:spcAft>
           </a:pPr>
           <a:r>
-            <a:rPr lang="en-US" sz="2500" kern="1200" dirty="0" smtClean="0"/>
+            <a:rPr lang="en-US" sz="2600" kern="1200" dirty="0" smtClean="0"/>
             <a:t>Event Thread</a:t>
           </a:r>
-          <a:endParaRPr lang="en-US" sz="2500" kern="1200" dirty="0"/>
+          <a:endParaRPr lang="en-US" sz="2600" kern="1200" dirty="0"/>
         </a:p>
       </dsp:txBody>
       <dsp:txXfrm>
-        <a:off x="0" y="1230884"/>
-        <a:ext cx="2486760" cy="495000"/>
+        <a:off x="0" y="1357349"/>
+        <a:ext cx="2486760" cy="514800"/>
       </dsp:txXfrm>
     </dsp:sp>
     <dsp:sp modelId="{E645AB5C-FEA3-4804-92D5-C7FE31DE78B3}">
@@ -5703,8 +5706,8 @@
       </dsp:nvSpPr>
       <dsp:spPr>
         <a:xfrm>
-          <a:off x="2486760" y="1037524"/>
-          <a:ext cx="497352" cy="881718"/>
+          <a:off x="2486760" y="1156255"/>
+          <a:ext cx="497352" cy="916987"/>
         </a:xfrm>
         <a:prstGeom prst="leftBrace">
           <a:avLst>
@@ -5747,8 +5750,8 @@
       </dsp:nvSpPr>
       <dsp:spPr>
         <a:xfrm>
-          <a:off x="3183053" y="1037524"/>
-          <a:ext cx="6763989" cy="881718"/>
+          <a:off x="3183053" y="1156255"/>
+          <a:ext cx="6763989" cy="916987"/>
         </a:xfrm>
         <a:prstGeom prst="rect">
           <a:avLst/>
@@ -5806,12 +5809,12 @@
         </a:fontRef>
       </dsp:style>
       <dsp:txBody>
-        <a:bodyPr spcFirstLastPara="0" vert="horz" wrap="square" lIns="95250" tIns="95250" rIns="95250" bIns="95250" numCol="1" spcCol="1270" anchor="ctr" anchorCtr="0">
+        <a:bodyPr spcFirstLastPara="0" vert="horz" wrap="square" lIns="99060" tIns="99060" rIns="99060" bIns="99060" numCol="1" spcCol="1270" anchor="ctr" anchorCtr="0">
           <a:noAutofit/>
         </a:bodyPr>
         <a:lstStyle/>
         <a:p>
-          <a:pPr marL="228600" lvl="1" indent="-228600" algn="l" defTabSz="1111250">
+          <a:pPr marL="228600" lvl="1" indent="-228600" algn="l" defTabSz="1155700">
             <a:lnSpc>
               <a:spcPct val="90000"/>
             </a:lnSpc>
@@ -5824,15 +5827,15 @@
             <a:buChar char="••"/>
           </a:pPr>
           <a:r>
-            <a:rPr lang="en-US" sz="2500" kern="1200" dirty="0" smtClean="0"/>
+            <a:rPr lang="en-US" sz="2600" kern="1200" dirty="0" smtClean="0"/>
             <a:t>Handles messages from clients in sequential order</a:t>
           </a:r>
-          <a:endParaRPr lang="en-US" sz="2500" kern="1200" dirty="0"/>
+          <a:endParaRPr lang="en-US" sz="2600" kern="1200" dirty="0"/>
         </a:p>
       </dsp:txBody>
       <dsp:txXfrm>
-        <a:off x="3183053" y="1037524"/>
-        <a:ext cx="6763989" cy="881718"/>
+        <a:off x="3183053" y="1156255"/>
+        <a:ext cx="6763989" cy="916987"/>
       </dsp:txXfrm>
     </dsp:sp>
     <dsp:sp modelId="{B01FF3D1-5BEF-4A0E-B64C-DC84FA1CD16B}">
@@ -5842,8 +5845,8 @@
       </dsp:nvSpPr>
       <dsp:spPr>
         <a:xfrm>
-          <a:off x="0" y="2073293"/>
-          <a:ext cx="2484332" cy="819843"/>
+          <a:off x="0" y="2233455"/>
+          <a:ext cx="2484332" cy="852637"/>
         </a:xfrm>
         <a:prstGeom prst="rect">
           <a:avLst/>
@@ -5867,12 +5870,12 @@
         <a:fontRef idx="minor"/>
       </dsp:style>
       <dsp:txBody>
-        <a:bodyPr spcFirstLastPara="0" vert="horz" wrap="square" lIns="177800" tIns="63500" rIns="177800" bIns="63500" numCol="1" spcCol="1270" anchor="ctr" anchorCtr="0">
+        <a:bodyPr spcFirstLastPara="0" vert="horz" wrap="square" lIns="184912" tIns="66040" rIns="184912" bIns="66040" numCol="1" spcCol="1270" anchor="ctr" anchorCtr="0">
           <a:noAutofit/>
         </a:bodyPr>
         <a:lstStyle/>
         <a:p>
-          <a:pPr lvl="0" algn="r" defTabSz="1111250">
+          <a:pPr lvl="0" algn="r" defTabSz="1155700">
             <a:lnSpc>
               <a:spcPct val="90000"/>
             </a:lnSpc>
@@ -5884,15 +5887,15 @@
             </a:spcAft>
           </a:pPr>
           <a:r>
-            <a:rPr lang="en-US" sz="2500" kern="1200" dirty="0" smtClean="0"/>
+            <a:rPr lang="en-US" sz="2600" kern="1200" dirty="0" smtClean="0"/>
             <a:t>Worker Thread(s)</a:t>
           </a:r>
-          <a:endParaRPr lang="en-US" sz="2500" kern="1200" dirty="0"/>
+          <a:endParaRPr lang="en-US" sz="2600" kern="1200" dirty="0"/>
         </a:p>
       </dsp:txBody>
       <dsp:txXfrm>
-        <a:off x="0" y="2073293"/>
-        <a:ext cx="2484332" cy="819843"/>
+        <a:off x="0" y="2233455"/>
+        <a:ext cx="2484332" cy="852637"/>
       </dsp:txXfrm>
     </dsp:sp>
     <dsp:sp modelId="{74C46C70-637E-4E9F-82BB-ACCB3E4634C7}">
@@ -5902,8 +5905,8 @@
       </dsp:nvSpPr>
       <dsp:spPr>
         <a:xfrm>
-          <a:off x="2484332" y="2009243"/>
-          <a:ext cx="496866" cy="947944"/>
+          <a:off x="2484332" y="2166842"/>
+          <a:ext cx="496866" cy="985862"/>
         </a:xfrm>
         <a:prstGeom prst="leftBrace">
           <a:avLst>
@@ -5946,8 +5949,8 @@
       </dsp:nvSpPr>
       <dsp:spPr>
         <a:xfrm>
-          <a:off x="3179945" y="2009243"/>
-          <a:ext cx="6757383" cy="947944"/>
+          <a:off x="3179945" y="2166842"/>
+          <a:ext cx="6757383" cy="985862"/>
         </a:xfrm>
         <a:prstGeom prst="rect">
           <a:avLst/>
@@ -6005,12 +6008,12 @@
         </a:fontRef>
       </dsp:style>
       <dsp:txBody>
-        <a:bodyPr spcFirstLastPara="0" vert="horz" wrap="square" lIns="95250" tIns="95250" rIns="95250" bIns="95250" numCol="1" spcCol="1270" anchor="ctr" anchorCtr="0">
+        <a:bodyPr spcFirstLastPara="0" vert="horz" wrap="square" lIns="99060" tIns="99060" rIns="99060" bIns="99060" numCol="1" spcCol="1270" anchor="ctr" anchorCtr="0">
           <a:noAutofit/>
         </a:bodyPr>
         <a:lstStyle/>
         <a:p>
-          <a:pPr marL="228600" lvl="1" indent="-228600" algn="l" defTabSz="1111250">
+          <a:pPr marL="228600" lvl="1" indent="-228600" algn="l" defTabSz="1155700">
             <a:lnSpc>
               <a:spcPct val="90000"/>
             </a:lnSpc>
@@ -6023,13 +6026,13 @@
             <a:buChar char="••"/>
           </a:pPr>
           <a:r>
-            <a:rPr lang="en-US" sz="2500" kern="1200" dirty="0" smtClean="0"/>
+            <a:rPr lang="en-US" sz="2600" kern="1200" dirty="0" smtClean="0"/>
             <a:t>One per client</a:t>
           </a:r>
-          <a:endParaRPr lang="en-US" sz="2500" kern="1200" dirty="0"/>
+          <a:endParaRPr lang="en-US" sz="2600" kern="1200" dirty="0"/>
         </a:p>
         <a:p>
-          <a:pPr marL="228600" lvl="1" indent="-228600" algn="l" defTabSz="1111250">
+          <a:pPr marL="228600" lvl="1" indent="-228600" algn="l" defTabSz="1155700">
             <a:lnSpc>
               <a:spcPct val="90000"/>
             </a:lnSpc>
@@ -6042,15 +6045,15 @@
             <a:buChar char="••"/>
           </a:pPr>
           <a:r>
-            <a:rPr lang="en-US" sz="2500" kern="1200" dirty="0" smtClean="0"/>
+            <a:rPr lang="en-US" sz="2600" kern="1200" dirty="0" smtClean="0"/>
             <a:t>Handles communication to/from each client</a:t>
           </a:r>
-          <a:endParaRPr lang="en-US" sz="2500" kern="1200" dirty="0"/>
+          <a:endParaRPr lang="en-US" sz="2600" kern="1200" dirty="0"/>
         </a:p>
       </dsp:txBody>
       <dsp:txXfrm>
-        <a:off x="3179945" y="2009243"/>
-        <a:ext cx="6757383" cy="947944"/>
+        <a:off x="3179945" y="2166842"/>
+        <a:ext cx="6757383" cy="985862"/>
       </dsp:txXfrm>
     </dsp:sp>
     <dsp:sp modelId="{A2F7EC1C-7CFE-4D1C-B0E5-2BFF6C7A23F6}">
@@ -6060,8 +6063,8 @@
       </dsp:nvSpPr>
       <dsp:spPr>
         <a:xfrm>
-          <a:off x="0" y="3604062"/>
-          <a:ext cx="2484332" cy="495000"/>
+          <a:off x="0" y="3486109"/>
+          <a:ext cx="2484332" cy="852637"/>
         </a:xfrm>
         <a:prstGeom prst="rect">
           <a:avLst/>
@@ -6085,12 +6088,12 @@
         <a:fontRef idx="minor"/>
       </dsp:style>
       <dsp:txBody>
-        <a:bodyPr spcFirstLastPara="0" vert="horz" wrap="square" lIns="177800" tIns="63500" rIns="177800" bIns="63500" numCol="1" spcCol="1270" anchor="ctr" anchorCtr="0">
+        <a:bodyPr spcFirstLastPara="0" vert="horz" wrap="square" lIns="184912" tIns="66040" rIns="184912" bIns="66040" numCol="1" spcCol="1270" anchor="ctr" anchorCtr="0">
           <a:noAutofit/>
         </a:bodyPr>
         <a:lstStyle/>
         <a:p>
-          <a:pPr lvl="0" algn="r" defTabSz="1111250">
+          <a:pPr lvl="0" algn="r" defTabSz="1155700">
             <a:lnSpc>
               <a:spcPct val="90000"/>
             </a:lnSpc>
@@ -6102,15 +6105,15 @@
             </a:spcAft>
           </a:pPr>
           <a:r>
-            <a:rPr lang="en-US" sz="2500" kern="1200" dirty="0" smtClean="0"/>
+            <a:rPr lang="en-US" sz="2600" kern="1200" dirty="0" smtClean="0"/>
             <a:t>Futures Thread</a:t>
           </a:r>
-          <a:endParaRPr lang="en-US" sz="2500" kern="1200" dirty="0"/>
+          <a:endParaRPr lang="en-US" sz="2600" kern="1200" dirty="0"/>
         </a:p>
       </dsp:txBody>
       <dsp:txXfrm>
-        <a:off x="0" y="3604062"/>
-        <a:ext cx="2484332" cy="495000"/>
+        <a:off x="0" y="3486109"/>
+        <a:ext cx="2484332" cy="852637"/>
       </dsp:txXfrm>
     </dsp:sp>
     <dsp:sp modelId="{F3261F53-3DB1-4899-9813-092B95B7323D}">
@@ -6120,8 +6123,8 @@
       </dsp:nvSpPr>
       <dsp:spPr>
         <a:xfrm>
-          <a:off x="2484332" y="3047187"/>
-          <a:ext cx="496866" cy="1608750"/>
+          <a:off x="2484332" y="3246305"/>
+          <a:ext cx="496866" cy="1332246"/>
         </a:xfrm>
         <a:prstGeom prst="leftBrace">
           <a:avLst>
@@ -6164,8 +6167,8 @@
       </dsp:nvSpPr>
       <dsp:spPr>
         <a:xfrm>
-          <a:off x="3179945" y="3047187"/>
-          <a:ext cx="6757383" cy="1608750"/>
+          <a:off x="3179945" y="3246305"/>
+          <a:ext cx="6757383" cy="1332246"/>
         </a:xfrm>
         <a:prstGeom prst="rect">
           <a:avLst/>
@@ -6223,12 +6226,12 @@
         </a:fontRef>
       </dsp:style>
       <dsp:txBody>
-        <a:bodyPr spcFirstLastPara="0" vert="horz" wrap="square" lIns="95250" tIns="95250" rIns="95250" bIns="95250" numCol="1" spcCol="1270" anchor="ctr" anchorCtr="0">
+        <a:bodyPr spcFirstLastPara="0" vert="horz" wrap="square" lIns="99060" tIns="99060" rIns="99060" bIns="99060" numCol="1" spcCol="1270" anchor="ctr" anchorCtr="0">
           <a:noAutofit/>
         </a:bodyPr>
         <a:lstStyle/>
         <a:p>
-          <a:pPr marL="228600" lvl="1" indent="-228600" algn="l" defTabSz="1111250">
+          <a:pPr marL="228600" lvl="1" indent="-228600" algn="l" defTabSz="1155700">
             <a:lnSpc>
               <a:spcPct val="90000"/>
             </a:lnSpc>
@@ -6241,23 +6244,23 @@
             <a:buChar char="••"/>
           </a:pPr>
           <a:r>
-            <a:rPr lang="en-US" sz="2500" kern="1200" dirty="0" smtClean="0"/>
-            <a:t>Handled by a </a:t>
-          </a:r>
-          <a:r>
-            <a:rPr lang="en-US" sz="2500" kern="1200" dirty="0" err="1" smtClean="0">
+            <a:rPr lang="en-US" sz="2600" kern="1200" dirty="0" err="1" smtClean="0">
               <a:latin typeface="Courier New" panose="02070309020205020404" pitchFamily="49" charset="0"/>
               <a:cs typeface="Courier New" panose="02070309020205020404" pitchFamily="49" charset="0"/>
             </a:rPr>
             <a:t>ScheduledExecutorService</a:t>
           </a:r>
-          <a:endParaRPr lang="en-US" sz="2500" kern="1200" dirty="0">
+          <a:r>
+            <a:rPr lang="en-US" sz="2600" kern="1200" dirty="0" smtClean="0"/>
+            <a:t>-controlled</a:t>
+          </a:r>
+          <a:endParaRPr lang="en-US" sz="2600" kern="1200" dirty="0">
             <a:latin typeface="Courier New" panose="02070309020205020404" pitchFamily="49" charset="0"/>
             <a:cs typeface="Courier New" panose="02070309020205020404" pitchFamily="49" charset="0"/>
           </a:endParaRPr>
         </a:p>
         <a:p>
-          <a:pPr marL="228600" lvl="1" indent="-228600" algn="l" defTabSz="1111250">
+          <a:pPr marL="228600" lvl="1" indent="-228600" algn="l" defTabSz="1155700">
             <a:lnSpc>
               <a:spcPct val="90000"/>
             </a:lnSpc>
@@ -6270,15 +6273,15 @@
             <a:buChar char="••"/>
           </a:pPr>
           <a:r>
-            <a:rPr lang="en-US" sz="2500" kern="1200" dirty="0" smtClean="0"/>
+            <a:rPr lang="en-US" sz="2600" kern="1200" dirty="0" smtClean="0"/>
             <a:t>Waits for time limits to occur, then advances the game state</a:t>
           </a:r>
-          <a:endParaRPr lang="en-US" sz="2500" kern="1200" dirty="0"/>
+          <a:endParaRPr lang="en-US" sz="2600" kern="1200" dirty="0"/>
         </a:p>
       </dsp:txBody>
       <dsp:txXfrm>
-        <a:off x="3179945" y="3047187"/>
-        <a:ext cx="6757383" cy="1608750"/>
+        <a:off x="3179945" y="3246305"/>
+        <a:ext cx="6757383" cy="1332246"/>
       </dsp:txXfrm>
     </dsp:sp>
   </dsp:spTree>
@@ -12834,6 +12837,944 @@
     </dgm:style>
   </dgm:styleLbl>
 </dgm:styleDef>
+</file>
+
+<file path=ppt/notesMasters/notesMaster1.xml><?xml version="1.0" encoding="utf-8"?>
+<p:notesMaster xmlns:a="http://schemas.openxmlformats.org/drawingml/2006/main" xmlns:r="http://schemas.openxmlformats.org/officeDocument/2006/relationships" xmlns:p="http://schemas.openxmlformats.org/presentationml/2006/main">
+  <p:cSld>
+    <p:bg>
+      <p:bgRef idx="1001">
+        <a:schemeClr val="bg1"/>
+      </p:bgRef>
+    </p:bg>
+    <p:spTree>
+      <p:nvGrpSpPr>
+        <p:cNvPr id="1" name=""/>
+        <p:cNvGrpSpPr/>
+        <p:nvPr/>
+      </p:nvGrpSpPr>
+      <p:grpSpPr>
+        <a:xfrm>
+          <a:off x="0" y="0"/>
+          <a:ext cx="0" cy="0"/>
+          <a:chOff x="0" y="0"/>
+          <a:chExt cx="0" cy="0"/>
+        </a:xfrm>
+      </p:grpSpPr>
+      <p:sp>
+        <p:nvSpPr>
+          <p:cNvPr id="2" name="Header Placeholder 1"/>
+          <p:cNvSpPr>
+            <a:spLocks noGrp="1"/>
+          </p:cNvSpPr>
+          <p:nvPr>
+            <p:ph type="hdr" sz="quarter"/>
+          </p:nvPr>
+        </p:nvSpPr>
+        <p:spPr>
+          <a:xfrm>
+            <a:off x="0" y="0"/>
+            <a:ext cx="2971800" cy="458788"/>
+          </a:xfrm>
+          <a:prstGeom prst="rect">
+            <a:avLst/>
+          </a:prstGeom>
+        </p:spPr>
+        <p:txBody>
+          <a:bodyPr vert="horz" lIns="91440" tIns="45720" rIns="91440" bIns="45720" rtlCol="0"/>
+          <a:lstStyle>
+            <a:lvl1pPr algn="l">
+              <a:defRPr sz="1200"/>
+            </a:lvl1pPr>
+          </a:lstStyle>
+          <a:p>
+            <a:endParaRPr lang="en-US"/>
+          </a:p>
+        </p:txBody>
+      </p:sp>
+      <p:sp>
+        <p:nvSpPr>
+          <p:cNvPr id="3" name="Date Placeholder 2"/>
+          <p:cNvSpPr>
+            <a:spLocks noGrp="1"/>
+          </p:cNvSpPr>
+          <p:nvPr>
+            <p:ph type="dt" idx="1"/>
+          </p:nvPr>
+        </p:nvSpPr>
+        <p:spPr>
+          <a:xfrm>
+            <a:off x="3884613" y="0"/>
+            <a:ext cx="2971800" cy="458788"/>
+          </a:xfrm>
+          <a:prstGeom prst="rect">
+            <a:avLst/>
+          </a:prstGeom>
+        </p:spPr>
+        <p:txBody>
+          <a:bodyPr vert="horz" lIns="91440" tIns="45720" rIns="91440" bIns="45720" rtlCol="0"/>
+          <a:lstStyle>
+            <a:lvl1pPr algn="r">
+              <a:defRPr sz="1200"/>
+            </a:lvl1pPr>
+          </a:lstStyle>
+          <a:p>
+            <a:fld id="{0E626692-3272-4FAF-AD8C-535AC46FFA2E}" type="datetimeFigureOut">
+              <a:rPr lang="en-US" smtClean="0"/>
+              <a:t>2015-12-08</a:t>
+            </a:fld>
+            <a:endParaRPr lang="en-US"/>
+          </a:p>
+        </p:txBody>
+      </p:sp>
+      <p:sp>
+        <p:nvSpPr>
+          <p:cNvPr id="4" name="Slide Image Placeholder 3"/>
+          <p:cNvSpPr>
+            <a:spLocks noGrp="1" noRot="1" noChangeAspect="1"/>
+          </p:cNvSpPr>
+          <p:nvPr>
+            <p:ph type="sldImg" idx="2"/>
+          </p:nvPr>
+        </p:nvSpPr>
+        <p:spPr>
+          <a:xfrm>
+            <a:off x="685800" y="1143000"/>
+            <a:ext cx="5486400" cy="3086100"/>
+          </a:xfrm>
+          <a:prstGeom prst="rect">
+            <a:avLst/>
+          </a:prstGeom>
+          <a:noFill/>
+          <a:ln w="12700">
+            <a:solidFill>
+              <a:prstClr val="black"/>
+            </a:solidFill>
+          </a:ln>
+        </p:spPr>
+        <p:txBody>
+          <a:bodyPr vert="horz" lIns="91440" tIns="45720" rIns="91440" bIns="45720" rtlCol="0" anchor="ctr"/>
+          <a:lstStyle/>
+          <a:p>
+            <a:endParaRPr lang="en-US"/>
+          </a:p>
+        </p:txBody>
+      </p:sp>
+      <p:sp>
+        <p:nvSpPr>
+          <p:cNvPr id="5" name="Notes Placeholder 4"/>
+          <p:cNvSpPr>
+            <a:spLocks noGrp="1"/>
+          </p:cNvSpPr>
+          <p:nvPr>
+            <p:ph type="body" sz="quarter" idx="3"/>
+          </p:nvPr>
+        </p:nvSpPr>
+        <p:spPr>
+          <a:xfrm>
+            <a:off x="685800" y="4400550"/>
+            <a:ext cx="5486400" cy="3600450"/>
+          </a:xfrm>
+          <a:prstGeom prst="rect">
+            <a:avLst/>
+          </a:prstGeom>
+        </p:spPr>
+        <p:txBody>
+          <a:bodyPr vert="horz" lIns="91440" tIns="45720" rIns="91440" bIns="45720" rtlCol="0"/>
+          <a:lstStyle/>
+          <a:p>
+            <a:pPr lvl="0"/>
+            <a:r>
+              <a:rPr lang="en-US" smtClean="0"/>
+              <a:t>Click to edit Master text styles</a:t>
+            </a:r>
+          </a:p>
+          <a:p>
+            <a:pPr lvl="1"/>
+            <a:r>
+              <a:rPr lang="en-US" smtClean="0"/>
+              <a:t>Second level</a:t>
+            </a:r>
+          </a:p>
+          <a:p>
+            <a:pPr lvl="2"/>
+            <a:r>
+              <a:rPr lang="en-US" smtClean="0"/>
+              <a:t>Third level</a:t>
+            </a:r>
+          </a:p>
+          <a:p>
+            <a:pPr lvl="3"/>
+            <a:r>
+              <a:rPr lang="en-US" smtClean="0"/>
+              <a:t>Fourth level</a:t>
+            </a:r>
+          </a:p>
+          <a:p>
+            <a:pPr lvl="4"/>
+            <a:r>
+              <a:rPr lang="en-US" smtClean="0"/>
+              <a:t>Fifth level</a:t>
+            </a:r>
+            <a:endParaRPr lang="en-US"/>
+          </a:p>
+        </p:txBody>
+      </p:sp>
+      <p:sp>
+        <p:nvSpPr>
+          <p:cNvPr id="6" name="Footer Placeholder 5"/>
+          <p:cNvSpPr>
+            <a:spLocks noGrp="1"/>
+          </p:cNvSpPr>
+          <p:nvPr>
+            <p:ph type="ftr" sz="quarter" idx="4"/>
+          </p:nvPr>
+        </p:nvSpPr>
+        <p:spPr>
+          <a:xfrm>
+            <a:off x="0" y="8685213"/>
+            <a:ext cx="2971800" cy="458787"/>
+          </a:xfrm>
+          <a:prstGeom prst="rect">
+            <a:avLst/>
+          </a:prstGeom>
+        </p:spPr>
+        <p:txBody>
+          <a:bodyPr vert="horz" lIns="91440" tIns="45720" rIns="91440" bIns="45720" rtlCol="0" anchor="b"/>
+          <a:lstStyle>
+            <a:lvl1pPr algn="l">
+              <a:defRPr sz="1200"/>
+            </a:lvl1pPr>
+          </a:lstStyle>
+          <a:p>
+            <a:endParaRPr lang="en-US"/>
+          </a:p>
+        </p:txBody>
+      </p:sp>
+      <p:sp>
+        <p:nvSpPr>
+          <p:cNvPr id="7" name="Slide Number Placeholder 6"/>
+          <p:cNvSpPr>
+            <a:spLocks noGrp="1"/>
+          </p:cNvSpPr>
+          <p:nvPr>
+            <p:ph type="sldNum" sz="quarter" idx="5"/>
+          </p:nvPr>
+        </p:nvSpPr>
+        <p:spPr>
+          <a:xfrm>
+            <a:off x="3884613" y="8685213"/>
+            <a:ext cx="2971800" cy="458787"/>
+          </a:xfrm>
+          <a:prstGeom prst="rect">
+            <a:avLst/>
+          </a:prstGeom>
+        </p:spPr>
+        <p:txBody>
+          <a:bodyPr vert="horz" lIns="91440" tIns="45720" rIns="91440" bIns="45720" rtlCol="0" anchor="b"/>
+          <a:lstStyle>
+            <a:lvl1pPr algn="r">
+              <a:defRPr sz="1200"/>
+            </a:lvl1pPr>
+          </a:lstStyle>
+          <a:p>
+            <a:fld id="{4ECD0F8E-67E4-464A-AF4D-AD10CE4ED16D}" type="slidenum">
+              <a:rPr lang="en-US" smtClean="0"/>
+              <a:t>‹#›</a:t>
+            </a:fld>
+            <a:endParaRPr lang="en-US"/>
+          </a:p>
+        </p:txBody>
+      </p:sp>
+    </p:spTree>
+    <p:extLst>
+      <p:ext uri="{BB962C8B-B14F-4D97-AF65-F5344CB8AC3E}">
+        <p14:creationId xmlns:p14="http://schemas.microsoft.com/office/powerpoint/2010/main" val="2906392014"/>
+      </p:ext>
+    </p:extLst>
+  </p:cSld>
+  <p:clrMap bg1="lt1" tx1="dk1" bg2="lt2" tx2="dk2" accent1="accent1" accent2="accent2" accent3="accent3" accent4="accent4" accent5="accent5" accent6="accent6" hlink="hlink" folHlink="folHlink"/>
+  <p:notesStyle>
+    <a:lvl1pPr marL="0" algn="l" defTabSz="914400" rtl="0" eaLnBrk="1" latinLnBrk="0" hangingPunct="1">
+      <a:defRPr sz="1200" kern="1200">
+        <a:solidFill>
+          <a:schemeClr val="tx1"/>
+        </a:solidFill>
+        <a:latin typeface="+mn-lt"/>
+        <a:ea typeface="+mn-ea"/>
+        <a:cs typeface="+mn-cs"/>
+      </a:defRPr>
+    </a:lvl1pPr>
+    <a:lvl2pPr marL="457200" algn="l" defTabSz="914400" rtl="0" eaLnBrk="1" latinLnBrk="0" hangingPunct="1">
+      <a:defRPr sz="1200" kern="1200">
+        <a:solidFill>
+          <a:schemeClr val="tx1"/>
+        </a:solidFill>
+        <a:latin typeface="+mn-lt"/>
+        <a:ea typeface="+mn-ea"/>
+        <a:cs typeface="+mn-cs"/>
+      </a:defRPr>
+    </a:lvl2pPr>
+    <a:lvl3pPr marL="914400" algn="l" defTabSz="914400" rtl="0" eaLnBrk="1" latinLnBrk="0" hangingPunct="1">
+      <a:defRPr sz="1200" kern="1200">
+        <a:solidFill>
+          <a:schemeClr val="tx1"/>
+        </a:solidFill>
+        <a:latin typeface="+mn-lt"/>
+        <a:ea typeface="+mn-ea"/>
+        <a:cs typeface="+mn-cs"/>
+      </a:defRPr>
+    </a:lvl3pPr>
+    <a:lvl4pPr marL="1371600" algn="l" defTabSz="914400" rtl="0" eaLnBrk="1" latinLnBrk="0" hangingPunct="1">
+      <a:defRPr sz="1200" kern="1200">
+        <a:solidFill>
+          <a:schemeClr val="tx1"/>
+        </a:solidFill>
+        <a:latin typeface="+mn-lt"/>
+        <a:ea typeface="+mn-ea"/>
+        <a:cs typeface="+mn-cs"/>
+      </a:defRPr>
+    </a:lvl4pPr>
+    <a:lvl5pPr marL="1828800" algn="l" defTabSz="914400" rtl="0" eaLnBrk="1" latinLnBrk="0" hangingPunct="1">
+      <a:defRPr sz="1200" kern="1200">
+        <a:solidFill>
+          <a:schemeClr val="tx1"/>
+        </a:solidFill>
+        <a:latin typeface="+mn-lt"/>
+        <a:ea typeface="+mn-ea"/>
+        <a:cs typeface="+mn-cs"/>
+      </a:defRPr>
+    </a:lvl5pPr>
+    <a:lvl6pPr marL="2286000" algn="l" defTabSz="914400" rtl="0" eaLnBrk="1" latinLnBrk="0" hangingPunct="1">
+      <a:defRPr sz="1200" kern="1200">
+        <a:solidFill>
+          <a:schemeClr val="tx1"/>
+        </a:solidFill>
+        <a:latin typeface="+mn-lt"/>
+        <a:ea typeface="+mn-ea"/>
+        <a:cs typeface="+mn-cs"/>
+      </a:defRPr>
+    </a:lvl6pPr>
+    <a:lvl7pPr marL="2743200" algn="l" defTabSz="914400" rtl="0" eaLnBrk="1" latinLnBrk="0" hangingPunct="1">
+      <a:defRPr sz="1200" kern="1200">
+        <a:solidFill>
+          <a:schemeClr val="tx1"/>
+        </a:solidFill>
+        <a:latin typeface="+mn-lt"/>
+        <a:ea typeface="+mn-ea"/>
+        <a:cs typeface="+mn-cs"/>
+      </a:defRPr>
+    </a:lvl7pPr>
+    <a:lvl8pPr marL="3200400" algn="l" defTabSz="914400" rtl="0" eaLnBrk="1" latinLnBrk="0" hangingPunct="1">
+      <a:defRPr sz="1200" kern="1200">
+        <a:solidFill>
+          <a:schemeClr val="tx1"/>
+        </a:solidFill>
+        <a:latin typeface="+mn-lt"/>
+        <a:ea typeface="+mn-ea"/>
+        <a:cs typeface="+mn-cs"/>
+      </a:defRPr>
+    </a:lvl8pPr>
+    <a:lvl9pPr marL="3657600" algn="l" defTabSz="914400" rtl="0" eaLnBrk="1" latinLnBrk="0" hangingPunct="1">
+      <a:defRPr sz="1200" kern="1200">
+        <a:solidFill>
+          <a:schemeClr val="tx1"/>
+        </a:solidFill>
+        <a:latin typeface="+mn-lt"/>
+        <a:ea typeface="+mn-ea"/>
+        <a:cs typeface="+mn-cs"/>
+      </a:defRPr>
+    </a:lvl9pPr>
+  </p:notesStyle>
+</p:notesMaster>
+</file>
+
+<file path=ppt/notesSlides/notesSlide1.xml><?xml version="1.0" encoding="utf-8"?>
+<p:notes xmlns:a="http://schemas.openxmlformats.org/drawingml/2006/main" xmlns:r="http://schemas.openxmlformats.org/officeDocument/2006/relationships" xmlns:p="http://schemas.openxmlformats.org/presentationml/2006/main">
+  <p:cSld>
+    <p:spTree>
+      <p:nvGrpSpPr>
+        <p:cNvPr id="1" name=""/>
+        <p:cNvGrpSpPr/>
+        <p:nvPr/>
+      </p:nvGrpSpPr>
+      <p:grpSpPr>
+        <a:xfrm>
+          <a:off x="0" y="0"/>
+          <a:ext cx="0" cy="0"/>
+          <a:chOff x="0" y="0"/>
+          <a:chExt cx="0" cy="0"/>
+        </a:xfrm>
+      </p:grpSpPr>
+      <p:sp>
+        <p:nvSpPr>
+          <p:cNvPr id="2" name="Slide Image Placeholder 1"/>
+          <p:cNvSpPr>
+            <a:spLocks noGrp="1" noRot="1" noChangeAspect="1"/>
+          </p:cNvSpPr>
+          <p:nvPr>
+            <p:ph type="sldImg"/>
+          </p:nvPr>
+        </p:nvSpPr>
+        <p:spPr/>
+      </p:sp>
+      <p:sp>
+        <p:nvSpPr>
+          <p:cNvPr id="3" name="Notes Placeholder 2"/>
+          <p:cNvSpPr>
+            <a:spLocks noGrp="1"/>
+          </p:cNvSpPr>
+          <p:nvPr>
+            <p:ph type="body" idx="1"/>
+          </p:nvPr>
+        </p:nvSpPr>
+        <p:spPr/>
+        <p:txBody>
+          <a:bodyPr/>
+          <a:lstStyle/>
+          <a:p>
+            <a:endParaRPr lang="en-US"/>
+          </a:p>
+        </p:txBody>
+      </p:sp>
+      <p:sp>
+        <p:nvSpPr>
+          <p:cNvPr id="4" name="Slide Number Placeholder 3"/>
+          <p:cNvSpPr>
+            <a:spLocks noGrp="1"/>
+          </p:cNvSpPr>
+          <p:nvPr>
+            <p:ph type="sldNum" sz="quarter" idx="10"/>
+          </p:nvPr>
+        </p:nvSpPr>
+        <p:spPr/>
+        <p:txBody>
+          <a:bodyPr/>
+          <a:lstStyle/>
+          <a:p>
+            <a:fld id="{4ECD0F8E-67E4-464A-AF4D-AD10CE4ED16D}" type="slidenum">
+              <a:rPr lang="en-US" smtClean="0"/>
+              <a:t>1</a:t>
+            </a:fld>
+            <a:endParaRPr lang="en-US"/>
+          </a:p>
+        </p:txBody>
+      </p:sp>
+    </p:spTree>
+    <p:extLst>
+      <p:ext uri="{BB962C8B-B14F-4D97-AF65-F5344CB8AC3E}">
+        <p14:creationId xmlns:p14="http://schemas.microsoft.com/office/powerpoint/2010/main" val="4095495150"/>
+      </p:ext>
+    </p:extLst>
+  </p:cSld>
+  <p:clrMapOvr>
+    <a:masterClrMapping/>
+  </p:clrMapOvr>
+</p:notes>
+</file>
+
+<file path=ppt/notesSlides/notesSlide2.xml><?xml version="1.0" encoding="utf-8"?>
+<p:notes xmlns:a="http://schemas.openxmlformats.org/drawingml/2006/main" xmlns:r="http://schemas.openxmlformats.org/officeDocument/2006/relationships" xmlns:p="http://schemas.openxmlformats.org/presentationml/2006/main">
+  <p:cSld>
+    <p:spTree>
+      <p:nvGrpSpPr>
+        <p:cNvPr id="1" name=""/>
+        <p:cNvGrpSpPr/>
+        <p:nvPr/>
+      </p:nvGrpSpPr>
+      <p:grpSpPr>
+        <a:xfrm>
+          <a:off x="0" y="0"/>
+          <a:ext cx="0" cy="0"/>
+          <a:chOff x="0" y="0"/>
+          <a:chExt cx="0" cy="0"/>
+        </a:xfrm>
+      </p:grpSpPr>
+      <p:sp>
+        <p:nvSpPr>
+          <p:cNvPr id="2" name="Slide Image Placeholder 1"/>
+          <p:cNvSpPr>
+            <a:spLocks noGrp="1" noRot="1" noChangeAspect="1"/>
+          </p:cNvSpPr>
+          <p:nvPr>
+            <p:ph type="sldImg"/>
+          </p:nvPr>
+        </p:nvSpPr>
+        <p:spPr/>
+      </p:sp>
+      <p:sp>
+        <p:nvSpPr>
+          <p:cNvPr id="3" name="Notes Placeholder 2"/>
+          <p:cNvSpPr>
+            <a:spLocks noGrp="1"/>
+          </p:cNvSpPr>
+          <p:nvPr>
+            <p:ph type="body" idx="1"/>
+          </p:nvPr>
+        </p:nvSpPr>
+        <p:spPr/>
+        <p:txBody>
+          <a:bodyPr/>
+          <a:lstStyle/>
+          <a:p>
+            <a:endParaRPr lang="en-US"/>
+          </a:p>
+        </p:txBody>
+      </p:sp>
+      <p:sp>
+        <p:nvSpPr>
+          <p:cNvPr id="4" name="Slide Number Placeholder 3"/>
+          <p:cNvSpPr>
+            <a:spLocks noGrp="1"/>
+          </p:cNvSpPr>
+          <p:nvPr>
+            <p:ph type="sldNum" sz="quarter" idx="10"/>
+          </p:nvPr>
+        </p:nvSpPr>
+        <p:spPr/>
+        <p:txBody>
+          <a:bodyPr/>
+          <a:lstStyle/>
+          <a:p>
+            <a:fld id="{4ECD0F8E-67E4-464A-AF4D-AD10CE4ED16D}" type="slidenum">
+              <a:rPr lang="en-US" smtClean="0"/>
+              <a:t>2</a:t>
+            </a:fld>
+            <a:endParaRPr lang="en-US"/>
+          </a:p>
+        </p:txBody>
+      </p:sp>
+    </p:spTree>
+    <p:extLst>
+      <p:ext uri="{BB962C8B-B14F-4D97-AF65-F5344CB8AC3E}">
+        <p14:creationId xmlns:p14="http://schemas.microsoft.com/office/powerpoint/2010/main" val="3494714154"/>
+      </p:ext>
+    </p:extLst>
+  </p:cSld>
+  <p:clrMapOvr>
+    <a:masterClrMapping/>
+  </p:clrMapOvr>
+</p:notes>
+</file>
+
+<file path=ppt/notesSlides/notesSlide3.xml><?xml version="1.0" encoding="utf-8"?>
+<p:notes xmlns:a="http://schemas.openxmlformats.org/drawingml/2006/main" xmlns:r="http://schemas.openxmlformats.org/officeDocument/2006/relationships" xmlns:p="http://schemas.openxmlformats.org/presentationml/2006/main">
+  <p:cSld>
+    <p:spTree>
+      <p:nvGrpSpPr>
+        <p:cNvPr id="1" name=""/>
+        <p:cNvGrpSpPr/>
+        <p:nvPr/>
+      </p:nvGrpSpPr>
+      <p:grpSpPr>
+        <a:xfrm>
+          <a:off x="0" y="0"/>
+          <a:ext cx="0" cy="0"/>
+          <a:chOff x="0" y="0"/>
+          <a:chExt cx="0" cy="0"/>
+        </a:xfrm>
+      </p:grpSpPr>
+      <p:sp>
+        <p:nvSpPr>
+          <p:cNvPr id="2" name="Slide Image Placeholder 1"/>
+          <p:cNvSpPr>
+            <a:spLocks noGrp="1" noRot="1" noChangeAspect="1"/>
+          </p:cNvSpPr>
+          <p:nvPr>
+            <p:ph type="sldImg"/>
+          </p:nvPr>
+        </p:nvSpPr>
+        <p:spPr/>
+      </p:sp>
+      <p:sp>
+        <p:nvSpPr>
+          <p:cNvPr id="3" name="Notes Placeholder 2"/>
+          <p:cNvSpPr>
+            <a:spLocks noGrp="1"/>
+          </p:cNvSpPr>
+          <p:nvPr>
+            <p:ph type="body" idx="1"/>
+          </p:nvPr>
+        </p:nvSpPr>
+        <p:spPr/>
+        <p:txBody>
+          <a:bodyPr/>
+          <a:lstStyle/>
+          <a:p>
+            <a:endParaRPr lang="en-US"/>
+          </a:p>
+        </p:txBody>
+      </p:sp>
+      <p:sp>
+        <p:nvSpPr>
+          <p:cNvPr id="4" name="Slide Number Placeholder 3"/>
+          <p:cNvSpPr>
+            <a:spLocks noGrp="1"/>
+          </p:cNvSpPr>
+          <p:nvPr>
+            <p:ph type="sldNum" sz="quarter" idx="10"/>
+          </p:nvPr>
+        </p:nvSpPr>
+        <p:spPr/>
+        <p:txBody>
+          <a:bodyPr/>
+          <a:lstStyle/>
+          <a:p>
+            <a:fld id="{4ECD0F8E-67E4-464A-AF4D-AD10CE4ED16D}" type="slidenum">
+              <a:rPr lang="en-US" smtClean="0"/>
+              <a:t>3</a:t>
+            </a:fld>
+            <a:endParaRPr lang="en-US"/>
+          </a:p>
+        </p:txBody>
+      </p:sp>
+    </p:spTree>
+    <p:extLst>
+      <p:ext uri="{BB962C8B-B14F-4D97-AF65-F5344CB8AC3E}">
+        <p14:creationId xmlns:p14="http://schemas.microsoft.com/office/powerpoint/2010/main" val="2256777238"/>
+      </p:ext>
+    </p:extLst>
+  </p:cSld>
+  <p:clrMapOvr>
+    <a:masterClrMapping/>
+  </p:clrMapOvr>
+</p:notes>
+</file>
+
+<file path=ppt/notesSlides/notesSlide4.xml><?xml version="1.0" encoding="utf-8"?>
+<p:notes xmlns:a="http://schemas.openxmlformats.org/drawingml/2006/main" xmlns:r="http://schemas.openxmlformats.org/officeDocument/2006/relationships" xmlns:p="http://schemas.openxmlformats.org/presentationml/2006/main">
+  <p:cSld>
+    <p:spTree>
+      <p:nvGrpSpPr>
+        <p:cNvPr id="1" name=""/>
+        <p:cNvGrpSpPr/>
+        <p:nvPr/>
+      </p:nvGrpSpPr>
+      <p:grpSpPr>
+        <a:xfrm>
+          <a:off x="0" y="0"/>
+          <a:ext cx="0" cy="0"/>
+          <a:chOff x="0" y="0"/>
+          <a:chExt cx="0" cy="0"/>
+        </a:xfrm>
+      </p:grpSpPr>
+      <p:sp>
+        <p:nvSpPr>
+          <p:cNvPr id="2" name="Slide Image Placeholder 1"/>
+          <p:cNvSpPr>
+            <a:spLocks noGrp="1" noRot="1" noChangeAspect="1"/>
+          </p:cNvSpPr>
+          <p:nvPr>
+            <p:ph type="sldImg"/>
+          </p:nvPr>
+        </p:nvSpPr>
+        <p:spPr/>
+      </p:sp>
+      <p:sp>
+        <p:nvSpPr>
+          <p:cNvPr id="3" name="Notes Placeholder 2"/>
+          <p:cNvSpPr>
+            <a:spLocks noGrp="1"/>
+          </p:cNvSpPr>
+          <p:nvPr>
+            <p:ph type="body" idx="1"/>
+          </p:nvPr>
+        </p:nvSpPr>
+        <p:spPr/>
+        <p:txBody>
+          <a:bodyPr/>
+          <a:lstStyle/>
+          <a:p>
+            <a:endParaRPr lang="en-US"/>
+          </a:p>
+        </p:txBody>
+      </p:sp>
+      <p:sp>
+        <p:nvSpPr>
+          <p:cNvPr id="4" name="Slide Number Placeholder 3"/>
+          <p:cNvSpPr>
+            <a:spLocks noGrp="1"/>
+          </p:cNvSpPr>
+          <p:nvPr>
+            <p:ph type="sldNum" sz="quarter" idx="10"/>
+          </p:nvPr>
+        </p:nvSpPr>
+        <p:spPr/>
+        <p:txBody>
+          <a:bodyPr/>
+          <a:lstStyle/>
+          <a:p>
+            <a:fld id="{4ECD0F8E-67E4-464A-AF4D-AD10CE4ED16D}" type="slidenum">
+              <a:rPr lang="en-US" smtClean="0"/>
+              <a:t>4</a:t>
+            </a:fld>
+            <a:endParaRPr lang="en-US"/>
+          </a:p>
+        </p:txBody>
+      </p:sp>
+    </p:spTree>
+    <p:extLst>
+      <p:ext uri="{BB962C8B-B14F-4D97-AF65-F5344CB8AC3E}">
+        <p14:creationId xmlns:p14="http://schemas.microsoft.com/office/powerpoint/2010/main" val="2930303420"/>
+      </p:ext>
+    </p:extLst>
+  </p:cSld>
+  <p:clrMapOvr>
+    <a:masterClrMapping/>
+  </p:clrMapOvr>
+</p:notes>
+</file>
+
+<file path=ppt/notesSlides/notesSlide5.xml><?xml version="1.0" encoding="utf-8"?>
+<p:notes xmlns:a="http://schemas.openxmlformats.org/drawingml/2006/main" xmlns:r="http://schemas.openxmlformats.org/officeDocument/2006/relationships" xmlns:p="http://schemas.openxmlformats.org/presentationml/2006/main">
+  <p:cSld>
+    <p:spTree>
+      <p:nvGrpSpPr>
+        <p:cNvPr id="1" name=""/>
+        <p:cNvGrpSpPr/>
+        <p:nvPr/>
+      </p:nvGrpSpPr>
+      <p:grpSpPr>
+        <a:xfrm>
+          <a:off x="0" y="0"/>
+          <a:ext cx="0" cy="0"/>
+          <a:chOff x="0" y="0"/>
+          <a:chExt cx="0" cy="0"/>
+        </a:xfrm>
+      </p:grpSpPr>
+      <p:sp>
+        <p:nvSpPr>
+          <p:cNvPr id="2" name="Slide Image Placeholder 1"/>
+          <p:cNvSpPr>
+            <a:spLocks noGrp="1" noRot="1" noChangeAspect="1"/>
+          </p:cNvSpPr>
+          <p:nvPr>
+            <p:ph type="sldImg"/>
+          </p:nvPr>
+        </p:nvSpPr>
+        <p:spPr/>
+      </p:sp>
+      <p:sp>
+        <p:nvSpPr>
+          <p:cNvPr id="3" name="Notes Placeholder 2"/>
+          <p:cNvSpPr>
+            <a:spLocks noGrp="1"/>
+          </p:cNvSpPr>
+          <p:nvPr>
+            <p:ph type="body" idx="1"/>
+          </p:nvPr>
+        </p:nvSpPr>
+        <p:spPr/>
+        <p:txBody>
+          <a:bodyPr/>
+          <a:lstStyle/>
+          <a:p>
+            <a:endParaRPr lang="en-US"/>
+          </a:p>
+        </p:txBody>
+      </p:sp>
+      <p:sp>
+        <p:nvSpPr>
+          <p:cNvPr id="4" name="Slide Number Placeholder 3"/>
+          <p:cNvSpPr>
+            <a:spLocks noGrp="1"/>
+          </p:cNvSpPr>
+          <p:nvPr>
+            <p:ph type="sldNum" sz="quarter" idx="10"/>
+          </p:nvPr>
+        </p:nvSpPr>
+        <p:spPr/>
+        <p:txBody>
+          <a:bodyPr/>
+          <a:lstStyle/>
+          <a:p>
+            <a:fld id="{4ECD0F8E-67E4-464A-AF4D-AD10CE4ED16D}" type="slidenum">
+              <a:rPr lang="en-US" smtClean="0"/>
+              <a:t>5</a:t>
+            </a:fld>
+            <a:endParaRPr lang="en-US"/>
+          </a:p>
+        </p:txBody>
+      </p:sp>
+    </p:spTree>
+    <p:extLst>
+      <p:ext uri="{BB962C8B-B14F-4D97-AF65-F5344CB8AC3E}">
+        <p14:creationId xmlns:p14="http://schemas.microsoft.com/office/powerpoint/2010/main" val="2882450205"/>
+      </p:ext>
+    </p:extLst>
+  </p:cSld>
+  <p:clrMapOvr>
+    <a:masterClrMapping/>
+  </p:clrMapOvr>
+</p:notes>
+</file>
+
+<file path=ppt/notesSlides/notesSlide6.xml><?xml version="1.0" encoding="utf-8"?>
+<p:notes xmlns:a="http://schemas.openxmlformats.org/drawingml/2006/main" xmlns:r="http://schemas.openxmlformats.org/officeDocument/2006/relationships" xmlns:p="http://schemas.openxmlformats.org/presentationml/2006/main">
+  <p:cSld>
+    <p:spTree>
+      <p:nvGrpSpPr>
+        <p:cNvPr id="1" name=""/>
+        <p:cNvGrpSpPr/>
+        <p:nvPr/>
+      </p:nvGrpSpPr>
+      <p:grpSpPr>
+        <a:xfrm>
+          <a:off x="0" y="0"/>
+          <a:ext cx="0" cy="0"/>
+          <a:chOff x="0" y="0"/>
+          <a:chExt cx="0" cy="0"/>
+        </a:xfrm>
+      </p:grpSpPr>
+      <p:sp>
+        <p:nvSpPr>
+          <p:cNvPr id="2" name="Slide Image Placeholder 1"/>
+          <p:cNvSpPr>
+            <a:spLocks noGrp="1" noRot="1" noChangeAspect="1"/>
+          </p:cNvSpPr>
+          <p:nvPr>
+            <p:ph type="sldImg"/>
+          </p:nvPr>
+        </p:nvSpPr>
+        <p:spPr/>
+      </p:sp>
+      <p:sp>
+        <p:nvSpPr>
+          <p:cNvPr id="3" name="Notes Placeholder 2"/>
+          <p:cNvSpPr>
+            <a:spLocks noGrp="1"/>
+          </p:cNvSpPr>
+          <p:nvPr>
+            <p:ph type="body" idx="1"/>
+          </p:nvPr>
+        </p:nvSpPr>
+        <p:spPr/>
+        <p:txBody>
+          <a:bodyPr/>
+          <a:lstStyle/>
+          <a:p>
+            <a:endParaRPr lang="en-US"/>
+          </a:p>
+        </p:txBody>
+      </p:sp>
+      <p:sp>
+        <p:nvSpPr>
+          <p:cNvPr id="4" name="Slide Number Placeholder 3"/>
+          <p:cNvSpPr>
+            <a:spLocks noGrp="1"/>
+          </p:cNvSpPr>
+          <p:nvPr>
+            <p:ph type="sldNum" sz="quarter" idx="10"/>
+          </p:nvPr>
+        </p:nvSpPr>
+        <p:spPr/>
+        <p:txBody>
+          <a:bodyPr/>
+          <a:lstStyle/>
+          <a:p>
+            <a:fld id="{4ECD0F8E-67E4-464A-AF4D-AD10CE4ED16D}" type="slidenum">
+              <a:rPr lang="en-US" smtClean="0"/>
+              <a:t>6</a:t>
+            </a:fld>
+            <a:endParaRPr lang="en-US"/>
+          </a:p>
+        </p:txBody>
+      </p:sp>
+    </p:spTree>
+    <p:extLst>
+      <p:ext uri="{BB962C8B-B14F-4D97-AF65-F5344CB8AC3E}">
+        <p14:creationId xmlns:p14="http://schemas.microsoft.com/office/powerpoint/2010/main" val="52140773"/>
+      </p:ext>
+    </p:extLst>
+  </p:cSld>
+  <p:clrMapOvr>
+    <a:masterClrMapping/>
+  </p:clrMapOvr>
+</p:notes>
+</file>
+
+<file path=ppt/notesSlides/notesSlide7.xml><?xml version="1.0" encoding="utf-8"?>
+<p:notes xmlns:a="http://schemas.openxmlformats.org/drawingml/2006/main" xmlns:r="http://schemas.openxmlformats.org/officeDocument/2006/relationships" xmlns:p="http://schemas.openxmlformats.org/presentationml/2006/main">
+  <p:cSld>
+    <p:spTree>
+      <p:nvGrpSpPr>
+        <p:cNvPr id="1" name=""/>
+        <p:cNvGrpSpPr/>
+        <p:nvPr/>
+      </p:nvGrpSpPr>
+      <p:grpSpPr>
+        <a:xfrm>
+          <a:off x="0" y="0"/>
+          <a:ext cx="0" cy="0"/>
+          <a:chOff x="0" y="0"/>
+          <a:chExt cx="0" cy="0"/>
+        </a:xfrm>
+      </p:grpSpPr>
+      <p:sp>
+        <p:nvSpPr>
+          <p:cNvPr id="2" name="Slide Image Placeholder 1"/>
+          <p:cNvSpPr>
+            <a:spLocks noGrp="1" noRot="1" noChangeAspect="1"/>
+          </p:cNvSpPr>
+          <p:nvPr>
+            <p:ph type="sldImg"/>
+          </p:nvPr>
+        </p:nvSpPr>
+        <p:spPr/>
+      </p:sp>
+      <p:sp>
+        <p:nvSpPr>
+          <p:cNvPr id="3" name="Notes Placeholder 2"/>
+          <p:cNvSpPr>
+            <a:spLocks noGrp="1"/>
+          </p:cNvSpPr>
+          <p:nvPr>
+            <p:ph type="body" idx="1"/>
+          </p:nvPr>
+        </p:nvSpPr>
+        <p:spPr/>
+        <p:txBody>
+          <a:bodyPr/>
+          <a:lstStyle/>
+          <a:p>
+            <a:endParaRPr lang="en-US"/>
+          </a:p>
+        </p:txBody>
+      </p:sp>
+      <p:sp>
+        <p:nvSpPr>
+          <p:cNvPr id="4" name="Slide Number Placeholder 3"/>
+          <p:cNvSpPr>
+            <a:spLocks noGrp="1"/>
+          </p:cNvSpPr>
+          <p:nvPr>
+            <p:ph type="sldNum" sz="quarter" idx="10"/>
+          </p:nvPr>
+        </p:nvSpPr>
+        <p:spPr/>
+        <p:txBody>
+          <a:bodyPr/>
+          <a:lstStyle/>
+          <a:p>
+            <a:fld id="{4ECD0F8E-67E4-464A-AF4D-AD10CE4ED16D}" type="slidenum">
+              <a:rPr lang="en-US" smtClean="0"/>
+              <a:t>7</a:t>
+            </a:fld>
+            <a:endParaRPr lang="en-US"/>
+          </a:p>
+        </p:txBody>
+      </p:sp>
+    </p:spTree>
+    <p:extLst>
+      <p:ext uri="{BB962C8B-B14F-4D97-AF65-F5344CB8AC3E}">
+        <p14:creationId xmlns:p14="http://schemas.microsoft.com/office/powerpoint/2010/main" val="140438248"/>
+      </p:ext>
+    </p:extLst>
+  </p:cSld>
+  <p:clrMapOvr>
+    <a:masterClrMapping/>
+  </p:clrMapOvr>
+</p:notes>
 </file>
 
 <file path=ppt/slideLayouts/slideLayout1.xml><?xml version="1.0" encoding="utf-8"?>
@@ -16324,7 +17265,7 @@
             <p:ph idx="1"/>
             <p:extLst>
               <p:ext uri="{D42A27DB-BD31-4B8C-83A1-F6EECF244321}">
-                <p14:modId xmlns:p14="http://schemas.microsoft.com/office/powerpoint/2010/main" val="908345454"/>
+                <p14:modId xmlns:p14="http://schemas.microsoft.com/office/powerpoint/2010/main" val="3440378267"/>
               </p:ext>
             </p:extLst>
           </p:nvPr>
@@ -16335,7 +17276,7 @@
         </p:xfrm>
         <a:graphic>
           <a:graphicData uri="http://schemas.openxmlformats.org/drawingml/2006/diagram">
-            <dgm:relIds xmlns:dgm="http://schemas.openxmlformats.org/drawingml/2006/diagram" xmlns:r="http://schemas.openxmlformats.org/officeDocument/2006/relationships" r:dm="rId2" r:lo="rId3" r:qs="rId4" r:cs="rId5"/>
+            <dgm:relIds xmlns:dgm="http://schemas.openxmlformats.org/drawingml/2006/diagram" xmlns:r="http://schemas.openxmlformats.org/officeDocument/2006/relationships" r:dm="rId3" r:lo="rId4" r:qs="rId5" r:cs="rId6"/>
           </a:graphicData>
         </a:graphic>
       </p:graphicFrame>
@@ -16451,7 +17392,7 @@
         </p:xfrm>
         <a:graphic>
           <a:graphicData uri="http://schemas.openxmlformats.org/drawingml/2006/diagram">
-            <dgm:relIds xmlns:dgm="http://schemas.openxmlformats.org/drawingml/2006/diagram" xmlns:r="http://schemas.openxmlformats.org/officeDocument/2006/relationships" r:dm="rId2" r:lo="rId3" r:qs="rId4" r:cs="rId5"/>
+            <dgm:relIds xmlns:dgm="http://schemas.openxmlformats.org/drawingml/2006/diagram" xmlns:r="http://schemas.openxmlformats.org/officeDocument/2006/relationships" r:dm="rId3" r:lo="rId4" r:qs="rId5" r:cs="rId6"/>
           </a:graphicData>
         </a:graphic>
       </p:graphicFrame>
@@ -17367,7 +18308,7 @@
         </p:xfrm>
         <a:graphic>
           <a:graphicData uri="http://schemas.openxmlformats.org/drawingml/2006/diagram">
-            <dgm:relIds xmlns:dgm="http://schemas.openxmlformats.org/drawingml/2006/diagram" xmlns:r="http://schemas.openxmlformats.org/officeDocument/2006/relationships" r:dm="rId2" r:lo="rId3" r:qs="rId4" r:cs="rId5"/>
+            <dgm:relIds xmlns:dgm="http://schemas.openxmlformats.org/drawingml/2006/diagram" xmlns:r="http://schemas.openxmlformats.org/officeDocument/2006/relationships" r:dm="rId3" r:lo="rId4" r:qs="rId5" r:cs="rId6"/>
           </a:graphicData>
         </a:graphic>
       </p:graphicFrame>
@@ -17519,7 +18460,7 @@
         </p:xfrm>
         <a:graphic>
           <a:graphicData uri="http://schemas.openxmlformats.org/drawingml/2006/diagram">
-            <dgm:relIds xmlns:dgm="http://schemas.openxmlformats.org/drawingml/2006/diagram" xmlns:r="http://schemas.openxmlformats.org/officeDocument/2006/relationships" r:dm="rId2" r:lo="rId3" r:qs="rId4" r:cs="rId5"/>
+            <dgm:relIds xmlns:dgm="http://schemas.openxmlformats.org/drawingml/2006/diagram" xmlns:r="http://schemas.openxmlformats.org/officeDocument/2006/relationships" r:dm="rId3" r:lo="rId4" r:qs="rId5" r:cs="rId6"/>
           </a:graphicData>
         </a:graphic>
       </p:graphicFrame>
@@ -17821,4 +18762,265 @@
     </a:ext>
   </a:extLst>
 </a:theme>
+</file>
+
+<file path=ppt/theme/theme2.xml><?xml version="1.0" encoding="utf-8"?>
+<a:theme xmlns:a="http://schemas.openxmlformats.org/drawingml/2006/main" name="Office Theme">
+  <a:themeElements>
+    <a:clrScheme name="Office">
+      <a:dk1>
+        <a:sysClr val="windowText" lastClr="000000"/>
+      </a:dk1>
+      <a:lt1>
+        <a:sysClr val="window" lastClr="FFFFFF"/>
+      </a:lt1>
+      <a:dk2>
+        <a:srgbClr val="44546A"/>
+      </a:dk2>
+      <a:lt2>
+        <a:srgbClr val="E7E6E6"/>
+      </a:lt2>
+      <a:accent1>
+        <a:srgbClr val="5B9BD5"/>
+      </a:accent1>
+      <a:accent2>
+        <a:srgbClr val="ED7D31"/>
+      </a:accent2>
+      <a:accent3>
+        <a:srgbClr val="A5A5A5"/>
+      </a:accent3>
+      <a:accent4>
+        <a:srgbClr val="FFC000"/>
+      </a:accent4>
+      <a:accent5>
+        <a:srgbClr val="4472C4"/>
+      </a:accent5>
+      <a:accent6>
+        <a:srgbClr val="70AD47"/>
+      </a:accent6>
+      <a:hlink>
+        <a:srgbClr val="0563C1"/>
+      </a:hlink>
+      <a:folHlink>
+        <a:srgbClr val="954F72"/>
+      </a:folHlink>
+    </a:clrScheme>
+    <a:fontScheme name="Office">
+      <a:majorFont>
+        <a:latin typeface="Calibri Light" panose="020F0302020204030204"/>
+        <a:ea typeface=""/>
+        <a:cs typeface=""/>
+        <a:font script="Jpan" typeface="ＭＳ Ｐゴシック"/>
+        <a:font script="Hang" typeface="맑은 고딕"/>
+        <a:font script="Hans" typeface="宋体"/>
+        <a:font script="Hant" typeface="新細明體"/>
+        <a:font script="Arab" typeface="Times New Roman"/>
+        <a:font script="Hebr" typeface="Times New Roman"/>
+        <a:font script="Thai" typeface="Angsana New"/>
+        <a:font script="Ethi" typeface="Nyala"/>
+        <a:font script="Beng" typeface="Vrinda"/>
+        <a:font script="Gujr" typeface="Shruti"/>
+        <a:font script="Khmr" typeface="MoolBoran"/>
+        <a:font script="Knda" typeface="Tunga"/>
+        <a:font script="Guru" typeface="Raavi"/>
+        <a:font script="Cans" typeface="Euphemia"/>
+        <a:font script="Cher" typeface="Plantagenet Cherokee"/>
+        <a:font script="Yiii" typeface="Microsoft Yi Baiti"/>
+        <a:font script="Tibt" typeface="Microsoft Himalaya"/>
+        <a:font script="Thaa" typeface="MV Boli"/>
+        <a:font script="Deva" typeface="Mangal"/>
+        <a:font script="Telu" typeface="Gautami"/>
+        <a:font script="Taml" typeface="Latha"/>
+        <a:font script="Syrc" typeface="Estrangelo Edessa"/>
+        <a:font script="Orya" typeface="Kalinga"/>
+        <a:font script="Mlym" typeface="Kartika"/>
+        <a:font script="Laoo" typeface="DokChampa"/>
+        <a:font script="Sinh" typeface="Iskoola Pota"/>
+        <a:font script="Mong" typeface="Mongolian Baiti"/>
+        <a:font script="Viet" typeface="Times New Roman"/>
+        <a:font script="Uigh" typeface="Microsoft Uighur"/>
+        <a:font script="Geor" typeface="Sylfaen"/>
+      </a:majorFont>
+      <a:minorFont>
+        <a:latin typeface="Calibri" panose="020F0502020204030204"/>
+        <a:ea typeface=""/>
+        <a:cs typeface=""/>
+        <a:font script="Jpan" typeface="ＭＳ Ｐゴシック"/>
+        <a:font script="Hang" typeface="맑은 고딕"/>
+        <a:font script="Hans" typeface="宋体"/>
+        <a:font script="Hant" typeface="新細明體"/>
+        <a:font script="Arab" typeface="Arial"/>
+        <a:font script="Hebr" typeface="Arial"/>
+        <a:font script="Thai" typeface="Cordia New"/>
+        <a:font script="Ethi" typeface="Nyala"/>
+        <a:font script="Beng" typeface="Vrinda"/>
+        <a:font script="Gujr" typeface="Shruti"/>
+        <a:font script="Khmr" typeface="DaunPenh"/>
+        <a:font script="Knda" typeface="Tunga"/>
+        <a:font script="Guru" typeface="Raavi"/>
+        <a:font script="Cans" typeface="Euphemia"/>
+        <a:font script="Cher" typeface="Plantagenet Cherokee"/>
+        <a:font script="Yiii" typeface="Microsoft Yi Baiti"/>
+        <a:font script="Tibt" typeface="Microsoft Himalaya"/>
+        <a:font script="Thaa" typeface="MV Boli"/>
+        <a:font script="Deva" typeface="Mangal"/>
+        <a:font script="Telu" typeface="Gautami"/>
+        <a:font script="Taml" typeface="Latha"/>
+        <a:font script="Syrc" typeface="Estrangelo Edessa"/>
+        <a:font script="Orya" typeface="Kalinga"/>
+        <a:font script="Mlym" typeface="Kartika"/>
+        <a:font script="Laoo" typeface="DokChampa"/>
+        <a:font script="Sinh" typeface="Iskoola Pota"/>
+        <a:font script="Mong" typeface="Mongolian Baiti"/>
+        <a:font script="Viet" typeface="Arial"/>
+        <a:font script="Uigh" typeface="Microsoft Uighur"/>
+        <a:font script="Geor" typeface="Sylfaen"/>
+      </a:minorFont>
+    </a:fontScheme>
+    <a:fmtScheme name="Office">
+      <a:fillStyleLst>
+        <a:solidFill>
+          <a:schemeClr val="phClr"/>
+        </a:solidFill>
+        <a:gradFill rotWithShape="1">
+          <a:gsLst>
+            <a:gs pos="0">
+              <a:schemeClr val="phClr">
+                <a:lumMod val="110000"/>
+                <a:satMod val="105000"/>
+                <a:tint val="67000"/>
+              </a:schemeClr>
+            </a:gs>
+            <a:gs pos="50000">
+              <a:schemeClr val="phClr">
+                <a:lumMod val="105000"/>
+                <a:satMod val="103000"/>
+                <a:tint val="73000"/>
+              </a:schemeClr>
+            </a:gs>
+            <a:gs pos="100000">
+              <a:schemeClr val="phClr">
+                <a:lumMod val="105000"/>
+                <a:satMod val="109000"/>
+                <a:tint val="81000"/>
+              </a:schemeClr>
+            </a:gs>
+          </a:gsLst>
+          <a:lin ang="5400000" scaled="0"/>
+        </a:gradFill>
+        <a:gradFill rotWithShape="1">
+          <a:gsLst>
+            <a:gs pos="0">
+              <a:schemeClr val="phClr">
+                <a:satMod val="103000"/>
+                <a:lumMod val="102000"/>
+                <a:tint val="94000"/>
+              </a:schemeClr>
+            </a:gs>
+            <a:gs pos="50000">
+              <a:schemeClr val="phClr">
+                <a:satMod val="110000"/>
+                <a:lumMod val="100000"/>
+                <a:shade val="100000"/>
+              </a:schemeClr>
+            </a:gs>
+            <a:gs pos="100000">
+              <a:schemeClr val="phClr">
+                <a:lumMod val="99000"/>
+                <a:satMod val="120000"/>
+                <a:shade val="78000"/>
+              </a:schemeClr>
+            </a:gs>
+          </a:gsLst>
+          <a:lin ang="5400000" scaled="0"/>
+        </a:gradFill>
+      </a:fillStyleLst>
+      <a:lnStyleLst>
+        <a:ln w="6350" cap="flat" cmpd="sng" algn="ctr">
+          <a:solidFill>
+            <a:schemeClr val="phClr"/>
+          </a:solidFill>
+          <a:prstDash val="solid"/>
+          <a:miter lim="800000"/>
+        </a:ln>
+        <a:ln w="12700" cap="flat" cmpd="sng" algn="ctr">
+          <a:solidFill>
+            <a:schemeClr val="phClr"/>
+          </a:solidFill>
+          <a:prstDash val="solid"/>
+          <a:miter lim="800000"/>
+        </a:ln>
+        <a:ln w="19050" cap="flat" cmpd="sng" algn="ctr">
+          <a:solidFill>
+            <a:schemeClr val="phClr"/>
+          </a:solidFill>
+          <a:prstDash val="solid"/>
+          <a:miter lim="800000"/>
+        </a:ln>
+      </a:lnStyleLst>
+      <a:effectStyleLst>
+        <a:effectStyle>
+          <a:effectLst/>
+        </a:effectStyle>
+        <a:effectStyle>
+          <a:effectLst/>
+        </a:effectStyle>
+        <a:effectStyle>
+          <a:effectLst>
+            <a:outerShdw blurRad="57150" dist="19050" dir="5400000" algn="ctr" rotWithShape="0">
+              <a:srgbClr val="000000">
+                <a:alpha val="63000"/>
+              </a:srgbClr>
+            </a:outerShdw>
+          </a:effectLst>
+        </a:effectStyle>
+      </a:effectStyleLst>
+      <a:bgFillStyleLst>
+        <a:solidFill>
+          <a:schemeClr val="phClr"/>
+        </a:solidFill>
+        <a:solidFill>
+          <a:schemeClr val="phClr">
+            <a:tint val="95000"/>
+            <a:satMod val="170000"/>
+          </a:schemeClr>
+        </a:solidFill>
+        <a:gradFill rotWithShape="1">
+          <a:gsLst>
+            <a:gs pos="0">
+              <a:schemeClr val="phClr">
+                <a:tint val="93000"/>
+                <a:satMod val="150000"/>
+                <a:shade val="98000"/>
+                <a:lumMod val="102000"/>
+              </a:schemeClr>
+            </a:gs>
+            <a:gs pos="50000">
+              <a:schemeClr val="phClr">
+                <a:tint val="98000"/>
+                <a:satMod val="130000"/>
+                <a:shade val="90000"/>
+                <a:lumMod val="103000"/>
+              </a:schemeClr>
+            </a:gs>
+            <a:gs pos="100000">
+              <a:schemeClr val="phClr">
+                <a:shade val="63000"/>
+                <a:satMod val="120000"/>
+              </a:schemeClr>
+            </a:gs>
+          </a:gsLst>
+          <a:lin ang="5400000" scaled="0"/>
+        </a:gradFill>
+      </a:bgFillStyleLst>
+    </a:fmtScheme>
+  </a:themeElements>
+  <a:objectDefaults/>
+  <a:extraClrSchemeLst/>
+  <a:extLst>
+    <a:ext uri="{05A4C25C-085E-4340-85A3-A5531E510DB2}">
+      <thm15:themeFamily xmlns:thm15="http://schemas.microsoft.com/office/thememl/2012/main" name="Office Theme" id="{62F939B6-93AF-4DB8-9C6B-D6C7DFDC589F}" vid="{4A3C46E8-61CC-4603-A589-7422A47A8E4A}"/>
+    </a:ext>
+  </a:extLst>
+</a:theme>
 </file>
</xml_diff>